<commit_message>
progress on group meeting
</commit_message>
<xml_diff>
--- a/Shared_A01212611/Slides/GroupMeeting001_pyrolysisProcessParameters.pptx
+++ b/Shared_A01212611/Slides/GroupMeeting001_pyrolysisProcessParameters.pptx
@@ -10,7 +10,13 @@
     <p:sldId id="260" r:id="rId4"/>
     <p:sldId id="258" r:id="rId5"/>
     <p:sldId id="261" r:id="rId6"/>
-    <p:sldId id="262" r:id="rId7"/>
+    <p:sldId id="264" r:id="rId7"/>
+    <p:sldId id="268" r:id="rId8"/>
+    <p:sldId id="262" r:id="rId9"/>
+    <p:sldId id="265" r:id="rId10"/>
+    <p:sldId id="266" r:id="rId11"/>
+    <p:sldId id="267" r:id="rId12"/>
+    <p:sldId id="263" r:id="rId13"/>
   </p:sldIdLst>
   <p:sldSz cx="12192000" cy="6858000"/>
   <p:notesSz cx="6858000" cy="9144000"/>
@@ -127,6 +133,8 @@
         <p14:section name="Related Article" id="{032748CF-34D4-4F00-AA86-51FC83977DA0}">
           <p14:sldIdLst>
             <p14:sldId id="261"/>
+            <p14:sldId id="264"/>
+            <p14:sldId id="268"/>
             <p14:sldId id="262"/>
           </p14:sldIdLst>
         </p14:section>
@@ -135,6 +143,14 @@
         </p14:section>
         <p14:section name="Side Slides" id="{1C99C5B6-3640-4323-B416-8D531FACFE49}">
           <p14:sldIdLst/>
+        </p14:section>
+        <p14:section name="Untitled Section" id="{B7EC1BB9-8C83-498D-9FF1-173ED106350B}">
+          <p14:sldIdLst>
+            <p14:sldId id="265"/>
+            <p14:sldId id="266"/>
+            <p14:sldId id="267"/>
+            <p14:sldId id="263"/>
+          </p14:sldIdLst>
         </p14:section>
       </p14:sectionLst>
     </p:ext>
@@ -172,7 +188,7 @@
 <p1510:revInfo xmlns:a="http://schemas.openxmlformats.org/drawingml/2006/main" xmlns:r="http://schemas.openxmlformats.org/officeDocument/2006/relationships" xmlns:p1510="http://schemas.microsoft.com/office/powerpoint/2015/10/main">
   <p1510:revLst>
     <p1510:client id="{A1255C39-2EFB-4D15-B143-B65097792378}" v="37" dt="2019-03-29T00:57:41.161"/>
-    <p1510:client id="{BA091A27-582A-4D6D-8346-D5CF8624059C}" v="16" dt="2019-03-29T14:44:09.603"/>
+    <p1510:client id="{BA091A27-582A-4D6D-8346-D5CF8624059C}" v="148" dt="2019-03-29T18:08:25.840"/>
   </p1510:revLst>
 </p1510:revInfo>
 </file>
@@ -468,11 +484,41 @@
   </pc:docChgLst>
   <pc:docChgLst>
     <pc:chgData name="Antonio Osamu Katagiri Tanaka" userId="2c28225e-d492-4964-8551-1b0a3c65dda0" providerId="ADAL" clId="{BA091A27-582A-4D6D-8346-D5CF8624059C}"/>
-    <pc:docChg chg="custSel addSld modSld">
-      <pc:chgData name="Antonio Osamu Katagiri Tanaka" userId="2c28225e-d492-4964-8551-1b0a3c65dda0" providerId="ADAL" clId="{BA091A27-582A-4D6D-8346-D5CF8624059C}" dt="2019-03-29T14:44:10.674" v="507" actId="27636"/>
+    <pc:docChg chg="undo custSel addSld delSld modSld sldOrd">
+      <pc:chgData name="Antonio Osamu Katagiri Tanaka" userId="2c28225e-d492-4964-8551-1b0a3c65dda0" providerId="ADAL" clId="{BA091A27-582A-4D6D-8346-D5CF8624059C}" dt="2019-03-29T18:11:35.461" v="1535" actId="20577"/>
       <pc:docMkLst>
         <pc:docMk/>
       </pc:docMkLst>
+      <pc:sldChg chg="modSp">
+        <pc:chgData name="Antonio Osamu Katagiri Tanaka" userId="2c28225e-d492-4964-8551-1b0a3c65dda0" providerId="ADAL" clId="{BA091A27-582A-4D6D-8346-D5CF8624059C}" dt="2019-03-29T17:31:38.150" v="1287" actId="20577"/>
+        <pc:sldMkLst>
+          <pc:docMk/>
+          <pc:sldMk cId="1105756717" sldId="257"/>
+        </pc:sldMkLst>
+        <pc:spChg chg="mod">
+          <ac:chgData name="Antonio Osamu Katagiri Tanaka" userId="2c28225e-d492-4964-8551-1b0a3c65dda0" providerId="ADAL" clId="{BA091A27-582A-4D6D-8346-D5CF8624059C}" dt="2019-03-29T17:31:38.150" v="1287" actId="20577"/>
+          <ac:spMkLst>
+            <pc:docMk/>
+            <pc:sldMk cId="1105756717" sldId="257"/>
+            <ac:spMk id="3" creationId="{6E971A9A-8031-4781-96A0-B9A5656935B5}"/>
+          </ac:spMkLst>
+        </pc:spChg>
+      </pc:sldChg>
+      <pc:sldChg chg="addSp modSp">
+        <pc:chgData name="Antonio Osamu Katagiri Tanaka" userId="2c28225e-d492-4964-8551-1b0a3c65dda0" providerId="ADAL" clId="{BA091A27-582A-4D6D-8346-D5CF8624059C}" dt="2019-03-29T17:53:14.189" v="1402" actId="1036"/>
+        <pc:sldMkLst>
+          <pc:docMk/>
+          <pc:sldMk cId="1147480841" sldId="258"/>
+        </pc:sldMkLst>
+        <pc:spChg chg="add mod">
+          <ac:chgData name="Antonio Osamu Katagiri Tanaka" userId="2c28225e-d492-4964-8551-1b0a3c65dda0" providerId="ADAL" clId="{BA091A27-582A-4D6D-8346-D5CF8624059C}" dt="2019-03-29T17:53:14.189" v="1402" actId="1036"/>
+          <ac:spMkLst>
+            <pc:docMk/>
+            <pc:sldMk cId="1147480841" sldId="258"/>
+            <ac:spMk id="2" creationId="{B47F02D3-7ADF-4C42-9EC9-7B6178B14E10}"/>
+          </ac:spMkLst>
+        </pc:spChg>
+      </pc:sldChg>
       <pc:sldChg chg="addSp modSp">
         <pc:chgData name="Antonio Osamu Katagiri Tanaka" userId="2c28225e-d492-4964-8551-1b0a3c65dda0" providerId="ADAL" clId="{BA091A27-582A-4D6D-8346-D5CF8624059C}" dt="2019-03-29T14:34:14.699" v="37" actId="1035"/>
         <pc:sldMkLst>
@@ -524,6 +570,263 @@
             <pc:docMk/>
             <pc:sldMk cId="3893641512" sldId="262"/>
             <ac:picMk id="5" creationId="{C80824D6-3081-4E40-B9B9-6AF2D5F3E407}"/>
+          </ac:picMkLst>
+        </pc:picChg>
+      </pc:sldChg>
+      <pc:sldChg chg="modSp add ord">
+        <pc:chgData name="Antonio Osamu Katagiri Tanaka" userId="2c28225e-d492-4964-8551-1b0a3c65dda0" providerId="ADAL" clId="{BA091A27-582A-4D6D-8346-D5CF8624059C}" dt="2019-03-29T17:30:36.770" v="1284"/>
+        <pc:sldMkLst>
+          <pc:docMk/>
+          <pc:sldMk cId="3604131991" sldId="263"/>
+        </pc:sldMkLst>
+        <pc:spChg chg="mod">
+          <ac:chgData name="Antonio Osamu Katagiri Tanaka" userId="2c28225e-d492-4964-8551-1b0a3c65dda0" providerId="ADAL" clId="{BA091A27-582A-4D6D-8346-D5CF8624059C}" dt="2019-03-29T15:52:32.017" v="518" actId="20577"/>
+          <ac:spMkLst>
+            <pc:docMk/>
+            <pc:sldMk cId="3604131991" sldId="263"/>
+            <ac:spMk id="4" creationId="{F9ED8BE6-F7AC-4FD8-8FA8-8C683A7C2F62}"/>
+          </ac:spMkLst>
+        </pc:spChg>
+        <pc:spChg chg="mod">
+          <ac:chgData name="Antonio Osamu Katagiri Tanaka" userId="2c28225e-d492-4964-8551-1b0a3c65dda0" providerId="ADAL" clId="{BA091A27-582A-4D6D-8346-D5CF8624059C}" dt="2019-03-29T15:53:27.381" v="528" actId="11"/>
+          <ac:spMkLst>
+            <pc:docMk/>
+            <pc:sldMk cId="3604131991" sldId="263"/>
+            <ac:spMk id="6" creationId="{058630E6-31AF-4451-B084-C9809D0DA4E8}"/>
+          </ac:spMkLst>
+        </pc:spChg>
+      </pc:sldChg>
+      <pc:sldChg chg="addSp modSp add ord">
+        <pc:chgData name="Antonio Osamu Katagiri Tanaka" userId="2c28225e-d492-4964-8551-1b0a3c65dda0" providerId="ADAL" clId="{BA091A27-582A-4D6D-8346-D5CF8624059C}" dt="2019-03-29T18:03:22.298" v="1403"/>
+        <pc:sldMkLst>
+          <pc:docMk/>
+          <pc:sldMk cId="2598307304" sldId="264"/>
+        </pc:sldMkLst>
+        <pc:spChg chg="mod">
+          <ac:chgData name="Antonio Osamu Katagiri Tanaka" userId="2c28225e-d492-4964-8551-1b0a3c65dda0" providerId="ADAL" clId="{BA091A27-582A-4D6D-8346-D5CF8624059C}" dt="2019-03-29T15:57:09.760" v="596"/>
+          <ac:spMkLst>
+            <pc:docMk/>
+            <pc:sldMk cId="2598307304" sldId="264"/>
+            <ac:spMk id="4" creationId="{F9ED8BE6-F7AC-4FD8-8FA8-8C683A7C2F62}"/>
+          </ac:spMkLst>
+        </pc:spChg>
+        <pc:spChg chg="add mod">
+          <ac:chgData name="Antonio Osamu Katagiri Tanaka" userId="2c28225e-d492-4964-8551-1b0a3c65dda0" providerId="ADAL" clId="{BA091A27-582A-4D6D-8346-D5CF8624059C}" dt="2019-03-29T16:34:12.077" v="607" actId="20577"/>
+          <ac:spMkLst>
+            <pc:docMk/>
+            <pc:sldMk cId="2598307304" sldId="264"/>
+            <ac:spMk id="5" creationId="{F2E92AD1-EC6F-4108-9565-5EC0B41458C4}"/>
+          </ac:spMkLst>
+        </pc:spChg>
+        <pc:spChg chg="mod">
+          <ac:chgData name="Antonio Osamu Katagiri Tanaka" userId="2c28225e-d492-4964-8551-1b0a3c65dda0" providerId="ADAL" clId="{BA091A27-582A-4D6D-8346-D5CF8624059C}" dt="2019-03-29T17:16:12.943" v="1106"/>
+          <ac:spMkLst>
+            <pc:docMk/>
+            <pc:sldMk cId="2598307304" sldId="264"/>
+            <ac:spMk id="6" creationId="{058630E6-31AF-4451-B084-C9809D0DA4E8}"/>
+          </ac:spMkLst>
+        </pc:spChg>
+        <pc:picChg chg="add mod">
+          <ac:chgData name="Antonio Osamu Katagiri Tanaka" userId="2c28225e-d492-4964-8551-1b0a3c65dda0" providerId="ADAL" clId="{BA091A27-582A-4D6D-8346-D5CF8624059C}" dt="2019-03-29T16:55:31.537" v="677" actId="1076"/>
+          <ac:picMkLst>
+            <pc:docMk/>
+            <pc:sldMk cId="2598307304" sldId="264"/>
+            <ac:picMk id="2" creationId="{E377F344-DB50-4440-91A5-80B84A927522}"/>
+          </ac:picMkLst>
+        </pc:picChg>
+      </pc:sldChg>
+      <pc:sldChg chg="add del">
+        <pc:chgData name="Antonio Osamu Katagiri Tanaka" userId="2c28225e-d492-4964-8551-1b0a3c65dda0" providerId="ADAL" clId="{BA091A27-582A-4D6D-8346-D5CF8624059C}" dt="2019-03-29T15:52:39.486" v="520"/>
+        <pc:sldMkLst>
+          <pc:docMk/>
+          <pc:sldMk cId="3523919289" sldId="264"/>
+        </pc:sldMkLst>
+      </pc:sldChg>
+      <pc:sldChg chg="addSp delSp modSp add">
+        <pc:chgData name="Antonio Osamu Katagiri Tanaka" userId="2c28225e-d492-4964-8551-1b0a3c65dda0" providerId="ADAL" clId="{BA091A27-582A-4D6D-8346-D5CF8624059C}" dt="2019-03-29T17:15:55.049" v="1102"/>
+        <pc:sldMkLst>
+          <pc:docMk/>
+          <pc:sldMk cId="1380703515" sldId="265"/>
+        </pc:sldMkLst>
+        <pc:spChg chg="add del mod">
+          <ac:chgData name="Antonio Osamu Katagiri Tanaka" userId="2c28225e-d492-4964-8551-1b0a3c65dda0" providerId="ADAL" clId="{BA091A27-582A-4D6D-8346-D5CF8624059C}" dt="2019-03-29T16:57:45.924" v="680" actId="478"/>
+          <ac:spMkLst>
+            <pc:docMk/>
+            <pc:sldMk cId="1380703515" sldId="265"/>
+            <ac:spMk id="3" creationId="{F2D6C959-D3CF-4514-AA3A-021593B7E906}"/>
+          </ac:spMkLst>
+        </pc:spChg>
+        <pc:spChg chg="mod">
+          <ac:chgData name="Antonio Osamu Katagiri Tanaka" userId="2c28225e-d492-4964-8551-1b0a3c65dda0" providerId="ADAL" clId="{BA091A27-582A-4D6D-8346-D5CF8624059C}" dt="2019-03-29T16:58:22.146" v="764" actId="20577"/>
+          <ac:spMkLst>
+            <pc:docMk/>
+            <pc:sldMk cId="1380703515" sldId="265"/>
+            <ac:spMk id="4" creationId="{F9ED8BE6-F7AC-4FD8-8FA8-8C683A7C2F62}"/>
+          </ac:spMkLst>
+        </pc:spChg>
+        <pc:spChg chg="del">
+          <ac:chgData name="Antonio Osamu Katagiri Tanaka" userId="2c28225e-d492-4964-8551-1b0a3c65dda0" providerId="ADAL" clId="{BA091A27-582A-4D6D-8346-D5CF8624059C}" dt="2019-03-29T16:57:43.482" v="679" actId="478"/>
+          <ac:spMkLst>
+            <pc:docMk/>
+            <pc:sldMk cId="1380703515" sldId="265"/>
+            <ac:spMk id="6" creationId="{058630E6-31AF-4451-B084-C9809D0DA4E8}"/>
+          </ac:spMkLst>
+        </pc:spChg>
+        <pc:spChg chg="add mod">
+          <ac:chgData name="Antonio Osamu Katagiri Tanaka" userId="2c28225e-d492-4964-8551-1b0a3c65dda0" providerId="ADAL" clId="{BA091A27-582A-4D6D-8346-D5CF8624059C}" dt="2019-03-29T17:03:27.661" v="864" actId="1076"/>
+          <ac:spMkLst>
+            <pc:docMk/>
+            <pc:sldMk cId="1380703515" sldId="265"/>
+            <ac:spMk id="7" creationId="{BA6AB84E-0624-4A71-9C0F-D062D87F5C5D}"/>
+          </ac:spMkLst>
+        </pc:spChg>
+        <pc:spChg chg="add mod">
+          <ac:chgData name="Antonio Osamu Katagiri Tanaka" userId="2c28225e-d492-4964-8551-1b0a3c65dda0" providerId="ADAL" clId="{BA091A27-582A-4D6D-8346-D5CF8624059C}" dt="2019-03-29T17:15:55.049" v="1102"/>
+          <ac:spMkLst>
+            <pc:docMk/>
+            <pc:sldMk cId="1380703515" sldId="265"/>
+            <ac:spMk id="8" creationId="{7917E339-891C-4EC8-AE76-E54A6D883E1E}"/>
+          </ac:spMkLst>
+        </pc:spChg>
+        <pc:picChg chg="add mod">
+          <ac:chgData name="Antonio Osamu Katagiri Tanaka" userId="2c28225e-d492-4964-8551-1b0a3c65dda0" providerId="ADAL" clId="{BA091A27-582A-4D6D-8346-D5CF8624059C}" dt="2019-03-29T17:09:59.191" v="873" actId="1076"/>
+          <ac:picMkLst>
+            <pc:docMk/>
+            <pc:sldMk cId="1380703515" sldId="265"/>
+            <ac:picMk id="5" creationId="{0E676B66-CA5E-44E1-B29C-AFCB39AFFCBF}"/>
+          </ac:picMkLst>
+        </pc:picChg>
+      </pc:sldChg>
+      <pc:sldChg chg="addSp delSp modSp add">
+        <pc:chgData name="Antonio Osamu Katagiri Tanaka" userId="2c28225e-d492-4964-8551-1b0a3c65dda0" providerId="ADAL" clId="{BA091A27-582A-4D6D-8346-D5CF8624059C}" dt="2019-03-29T17:04:00.857" v="872" actId="1076"/>
+        <pc:sldMkLst>
+          <pc:docMk/>
+          <pc:sldMk cId="3341228731" sldId="266"/>
+        </pc:sldMkLst>
+        <pc:spChg chg="add del mod">
+          <ac:chgData name="Antonio Osamu Katagiri Tanaka" userId="2c28225e-d492-4964-8551-1b0a3c65dda0" providerId="ADAL" clId="{BA091A27-582A-4D6D-8346-D5CF8624059C}" dt="2019-03-29T17:02:29.486" v="855" actId="478"/>
+          <ac:spMkLst>
+            <pc:docMk/>
+            <pc:sldMk cId="3341228731" sldId="266"/>
+            <ac:spMk id="2" creationId="{D6479A18-5946-4696-B873-CDCA4D915387}"/>
+          </ac:spMkLst>
+        </pc:spChg>
+        <pc:spChg chg="mod">
+          <ac:chgData name="Antonio Osamu Katagiri Tanaka" userId="2c28225e-d492-4964-8551-1b0a3c65dda0" providerId="ADAL" clId="{BA091A27-582A-4D6D-8346-D5CF8624059C}" dt="2019-03-29T17:01:19.711" v="839" actId="20577"/>
+          <ac:spMkLst>
+            <pc:docMk/>
+            <pc:sldMk cId="3341228731" sldId="266"/>
+            <ac:spMk id="4" creationId="{F9ED8BE6-F7AC-4FD8-8FA8-8C683A7C2F62}"/>
+          </ac:spMkLst>
+        </pc:spChg>
+        <pc:spChg chg="mod">
+          <ac:chgData name="Antonio Osamu Katagiri Tanaka" userId="2c28225e-d492-4964-8551-1b0a3c65dda0" providerId="ADAL" clId="{BA091A27-582A-4D6D-8346-D5CF8624059C}" dt="2019-03-29T17:03:51.926" v="869" actId="1076"/>
+          <ac:spMkLst>
+            <pc:docMk/>
+            <pc:sldMk cId="3341228731" sldId="266"/>
+            <ac:spMk id="7" creationId="{BA6AB84E-0624-4A71-9C0F-D062D87F5C5D}"/>
+          </ac:spMkLst>
+        </pc:spChg>
+        <pc:picChg chg="add mod">
+          <ac:chgData name="Antonio Osamu Katagiri Tanaka" userId="2c28225e-d492-4964-8551-1b0a3c65dda0" providerId="ADAL" clId="{BA091A27-582A-4D6D-8346-D5CF8624059C}" dt="2019-03-29T17:04:00.857" v="872" actId="1076"/>
+          <ac:picMkLst>
+            <pc:docMk/>
+            <pc:sldMk cId="3341228731" sldId="266"/>
+            <ac:picMk id="3" creationId="{3E035629-3447-43D2-9AA4-52C71B96FF24}"/>
+          </ac:picMkLst>
+        </pc:picChg>
+        <pc:picChg chg="del">
+          <ac:chgData name="Antonio Osamu Katagiri Tanaka" userId="2c28225e-d492-4964-8551-1b0a3c65dda0" providerId="ADAL" clId="{BA091A27-582A-4D6D-8346-D5CF8624059C}" dt="2019-03-29T17:02:58.141" v="858" actId="478"/>
+          <ac:picMkLst>
+            <pc:docMk/>
+            <pc:sldMk cId="3341228731" sldId="266"/>
+            <ac:picMk id="5" creationId="{0E676B66-CA5E-44E1-B29C-AFCB39AFFCBF}"/>
+          </ac:picMkLst>
+        </pc:picChg>
+      </pc:sldChg>
+      <pc:sldChg chg="addSp delSp modSp add">
+        <pc:chgData name="Antonio Osamu Katagiri Tanaka" userId="2c28225e-d492-4964-8551-1b0a3c65dda0" providerId="ADAL" clId="{BA091A27-582A-4D6D-8346-D5CF8624059C}" dt="2019-03-29T17:38:04.876" v="1354" actId="14100"/>
+        <pc:sldMkLst>
+          <pc:docMk/>
+          <pc:sldMk cId="4191868023" sldId="267"/>
+        </pc:sldMkLst>
+        <pc:spChg chg="mod">
+          <ac:chgData name="Antonio Osamu Katagiri Tanaka" userId="2c28225e-d492-4964-8551-1b0a3c65dda0" providerId="ADAL" clId="{BA091A27-582A-4D6D-8346-D5CF8624059C}" dt="2019-03-29T17:34:38.530" v="1307" actId="20577"/>
+          <ac:spMkLst>
+            <pc:docMk/>
+            <pc:sldMk cId="4191868023" sldId="267"/>
+            <ac:spMk id="6" creationId="{058630E6-31AF-4451-B084-C9809D0DA4E8}"/>
+          </ac:spMkLst>
+        </pc:spChg>
+        <pc:spChg chg="add mod">
+          <ac:chgData name="Antonio Osamu Katagiri Tanaka" userId="2c28225e-d492-4964-8551-1b0a3c65dda0" providerId="ADAL" clId="{BA091A27-582A-4D6D-8346-D5CF8624059C}" dt="2019-03-29T17:38:04.876" v="1354" actId="14100"/>
+          <ac:spMkLst>
+            <pc:docMk/>
+            <pc:sldMk cId="4191868023" sldId="267"/>
+            <ac:spMk id="7" creationId="{AEA38D39-5E27-4655-B893-DC348B261AFB}"/>
+          </ac:spMkLst>
+        </pc:spChg>
+        <pc:picChg chg="del mod">
+          <ac:chgData name="Antonio Osamu Katagiri Tanaka" userId="2c28225e-d492-4964-8551-1b0a3c65dda0" providerId="ADAL" clId="{BA091A27-582A-4D6D-8346-D5CF8624059C}" dt="2019-03-29T17:25:53.922" v="1109" actId="478"/>
+          <ac:picMkLst>
+            <pc:docMk/>
+            <pc:sldMk cId="4191868023" sldId="267"/>
+            <ac:picMk id="2" creationId="{E377F344-DB50-4440-91A5-80B84A927522}"/>
+          </ac:picMkLst>
+        </pc:picChg>
+        <pc:picChg chg="add mod">
+          <ac:chgData name="Antonio Osamu Katagiri Tanaka" userId="2c28225e-d492-4964-8551-1b0a3c65dda0" providerId="ADAL" clId="{BA091A27-582A-4D6D-8346-D5CF8624059C}" dt="2019-03-29T17:29:50.285" v="1260" actId="1076"/>
+          <ac:picMkLst>
+            <pc:docMk/>
+            <pc:sldMk cId="4191868023" sldId="267"/>
+            <ac:picMk id="3" creationId="{E8231BD3-B268-44AA-AEEE-9AE84C31AFA1}"/>
+          </ac:picMkLst>
+        </pc:picChg>
+      </pc:sldChg>
+      <pc:sldChg chg="addSp delSp modSp add">
+        <pc:chgData name="Antonio Osamu Katagiri Tanaka" userId="2c28225e-d492-4964-8551-1b0a3c65dda0" providerId="ADAL" clId="{BA091A27-582A-4D6D-8346-D5CF8624059C}" dt="2019-03-29T18:11:35.461" v="1535" actId="20577"/>
+        <pc:sldMkLst>
+          <pc:docMk/>
+          <pc:sldMk cId="3853310930" sldId="268"/>
+        </pc:sldMkLst>
+        <pc:spChg chg="mod">
+          <ac:chgData name="Antonio Osamu Katagiri Tanaka" userId="2c28225e-d492-4964-8551-1b0a3c65dda0" providerId="ADAL" clId="{BA091A27-582A-4D6D-8346-D5CF8624059C}" dt="2019-03-29T18:05:46.622" v="1448" actId="20577"/>
+          <ac:spMkLst>
+            <pc:docMk/>
+            <pc:sldMk cId="3853310930" sldId="268"/>
+            <ac:spMk id="4" creationId="{F9ED8BE6-F7AC-4FD8-8FA8-8C683A7C2F62}"/>
+          </ac:spMkLst>
+        </pc:spChg>
+        <pc:spChg chg="del">
+          <ac:chgData name="Antonio Osamu Katagiri Tanaka" userId="2c28225e-d492-4964-8551-1b0a3c65dda0" providerId="ADAL" clId="{BA091A27-582A-4D6D-8346-D5CF8624059C}" dt="2019-03-29T18:06:06.650" v="1450" actId="478"/>
+          <ac:spMkLst>
+            <pc:docMk/>
+            <pc:sldMk cId="3853310930" sldId="268"/>
+            <ac:spMk id="5" creationId="{F2E92AD1-EC6F-4108-9565-5EC0B41458C4}"/>
+          </ac:spMkLst>
+        </pc:spChg>
+        <pc:spChg chg="mod">
+          <ac:chgData name="Antonio Osamu Katagiri Tanaka" userId="2c28225e-d492-4964-8551-1b0a3c65dda0" providerId="ADAL" clId="{BA091A27-582A-4D6D-8346-D5CF8624059C}" dt="2019-03-29T18:11:35.461" v="1535" actId="20577"/>
+          <ac:spMkLst>
+            <pc:docMk/>
+            <pc:sldMk cId="3853310930" sldId="268"/>
+            <ac:spMk id="6" creationId="{058630E6-31AF-4451-B084-C9809D0DA4E8}"/>
+          </ac:spMkLst>
+        </pc:spChg>
+        <pc:spChg chg="add">
+          <ac:chgData name="Antonio Osamu Katagiri Tanaka" userId="2c28225e-d492-4964-8551-1b0a3c65dda0" providerId="ADAL" clId="{BA091A27-582A-4D6D-8346-D5CF8624059C}" dt="2019-03-29T18:06:07.002" v="1451"/>
+          <ac:spMkLst>
+            <pc:docMk/>
+            <pc:sldMk cId="3853310930" sldId="268"/>
+            <ac:spMk id="7" creationId="{017719D5-6169-4770-9360-3AF88034324B}"/>
+          </ac:spMkLst>
+        </pc:spChg>
+        <pc:picChg chg="del">
+          <ac:chgData name="Antonio Osamu Katagiri Tanaka" userId="2c28225e-d492-4964-8551-1b0a3c65dda0" providerId="ADAL" clId="{BA091A27-582A-4D6D-8346-D5CF8624059C}" dt="2019-03-29T18:05:54.064" v="1449" actId="478"/>
+          <ac:picMkLst>
+            <pc:docMk/>
+            <pc:sldMk cId="3853310930" sldId="268"/>
+            <ac:picMk id="2" creationId="{E377F344-DB50-4440-91A5-80B84A927522}"/>
           </ac:picMkLst>
         </pc:picChg>
       </pc:sldChg>
@@ -3948,6 +4251,868 @@
 </p:sld>
 </file>
 
+<file path=ppt/slides/slide10.xml><?xml version="1.0" encoding="utf-8"?>
+<p:sld xmlns:a="http://schemas.openxmlformats.org/drawingml/2006/main" xmlns:r="http://schemas.openxmlformats.org/officeDocument/2006/relationships" xmlns:p="http://schemas.openxmlformats.org/presentationml/2006/main">
+  <p:cSld>
+    <p:spTree>
+      <p:nvGrpSpPr>
+        <p:cNvPr id="1" name=""/>
+        <p:cNvGrpSpPr/>
+        <p:nvPr/>
+      </p:nvGrpSpPr>
+      <p:grpSpPr>
+        <a:xfrm>
+          <a:off x="0" y="0"/>
+          <a:ext cx="0" cy="0"/>
+          <a:chOff x="0" y="0"/>
+          <a:chExt cx="0" cy="0"/>
+        </a:xfrm>
+      </p:grpSpPr>
+      <p:sp>
+        <p:nvSpPr>
+          <p:cNvPr id="4" name="Title 1">
+            <a:extLst>
+              <a:ext uri="{FF2B5EF4-FFF2-40B4-BE49-F238E27FC236}">
+                <a16:creationId xmlns:a16="http://schemas.microsoft.com/office/drawing/2014/main" id="{F9ED8BE6-F7AC-4FD8-8FA8-8C683A7C2F62}"/>
+              </a:ext>
+            </a:extLst>
+          </p:cNvPr>
+          <p:cNvSpPr>
+            <a:spLocks noGrp="1"/>
+          </p:cNvSpPr>
+          <p:nvPr>
+            <p:ph type="title"/>
+          </p:nvPr>
+        </p:nvSpPr>
+        <p:spPr>
+          <a:xfrm>
+            <a:off x="949040" y="365125"/>
+            <a:ext cx="11242960" cy="1325563"/>
+          </a:xfrm>
+        </p:spPr>
+        <p:txBody>
+          <a:bodyPr/>
+          <a:lstStyle/>
+          <a:p>
+            <a:r>
+              <a:rPr lang="en-GB" dirty="0">
+                <a:solidFill>
+                  <a:schemeClr val="bg1">
+                    <a:lumMod val="95000"/>
+                  </a:schemeClr>
+                </a:solidFill>
+                <a:latin typeface="Arial Nova Light" panose="020B0304020202020204" pitchFamily="34" charset="0"/>
+              </a:rPr>
+              <a:t>Characteristics of some thermal decomposition processes</a:t>
+            </a:r>
+          </a:p>
+        </p:txBody>
+      </p:sp>
+      <p:sp>
+        <p:nvSpPr>
+          <p:cNvPr id="7" name="Rectangle 6">
+            <a:extLst>
+              <a:ext uri="{FF2B5EF4-FFF2-40B4-BE49-F238E27FC236}">
+                <a16:creationId xmlns:a16="http://schemas.microsoft.com/office/drawing/2014/main" id="{BA6AB84E-0624-4A71-9C0F-D062D87F5C5D}"/>
+              </a:ext>
+            </a:extLst>
+          </p:cNvPr>
+          <p:cNvSpPr/>
+          <p:nvPr/>
+        </p:nvSpPr>
+        <p:spPr>
+          <a:xfrm>
+            <a:off x="949040" y="6550223"/>
+            <a:ext cx="11222719" cy="307777"/>
+          </a:xfrm>
+          <a:prstGeom prst="rect">
+            <a:avLst/>
+          </a:prstGeom>
+        </p:spPr>
+        <p:txBody>
+          <a:bodyPr wrap="square">
+            <a:spAutoFit/>
+          </a:bodyPr>
+          <a:lstStyle/>
+          <a:p>
+            <a:pPr marL="304800" indent="-304800"/>
+            <a:r>
+              <a:rPr lang="en-GB" sz="1400" dirty="0">
+                <a:solidFill>
+                  <a:schemeClr val="bg1">
+                    <a:lumMod val="95000"/>
+                  </a:schemeClr>
+                </a:solidFill>
+                <a:latin typeface="Arial Nova Light" panose="020B0304020202020204" pitchFamily="34" charset="0"/>
+              </a:rPr>
+              <a:t>Mohan, D., Pittman Jr., C.U., Steele, P.H., 2003. Pyrolysis of Wood/Biomass for Bio- oil: A Critical Review. Energy Fuels 20, 848–889.</a:t>
+            </a:r>
+          </a:p>
+        </p:txBody>
+      </p:sp>
+      <p:pic>
+        <p:nvPicPr>
+          <p:cNvPr id="3" name="Picture 2">
+            <a:extLst>
+              <a:ext uri="{FF2B5EF4-FFF2-40B4-BE49-F238E27FC236}">
+                <a16:creationId xmlns:a16="http://schemas.microsoft.com/office/drawing/2014/main" id="{3E035629-3447-43D2-9AA4-52C71B96FF24}"/>
+              </a:ext>
+            </a:extLst>
+          </p:cNvPr>
+          <p:cNvPicPr>
+            <a:picLocks noChangeAspect="1"/>
+          </p:cNvPicPr>
+          <p:nvPr/>
+        </p:nvPicPr>
+        <p:blipFill>
+          <a:blip r:embed="rId2"/>
+          <a:stretch>
+            <a:fillRect/>
+          </a:stretch>
+        </p:blipFill>
+        <p:spPr>
+          <a:xfrm>
+            <a:off x="3146444" y="1690688"/>
+            <a:ext cx="6848152" cy="4802187"/>
+          </a:xfrm>
+          <a:prstGeom prst="rect">
+            <a:avLst/>
+          </a:prstGeom>
+        </p:spPr>
+      </p:pic>
+    </p:spTree>
+    <p:extLst>
+      <p:ext uri="{BB962C8B-B14F-4D97-AF65-F5344CB8AC3E}">
+        <p14:creationId xmlns:p14="http://schemas.microsoft.com/office/powerpoint/2010/main" val="3341228731"/>
+      </p:ext>
+    </p:extLst>
+  </p:cSld>
+  <p:clrMapOvr>
+    <a:masterClrMapping/>
+  </p:clrMapOvr>
+</p:sld>
+</file>
+
+<file path=ppt/slides/slide11.xml><?xml version="1.0" encoding="utf-8"?>
+<p:sld xmlns:a="http://schemas.openxmlformats.org/drawingml/2006/main" xmlns:r="http://schemas.openxmlformats.org/officeDocument/2006/relationships" xmlns:p="http://schemas.openxmlformats.org/presentationml/2006/main">
+  <p:cSld>
+    <p:spTree>
+      <p:nvGrpSpPr>
+        <p:cNvPr id="1" name=""/>
+        <p:cNvGrpSpPr/>
+        <p:nvPr/>
+      </p:nvGrpSpPr>
+      <p:grpSpPr>
+        <a:xfrm>
+          <a:off x="0" y="0"/>
+          <a:ext cx="0" cy="0"/>
+          <a:chOff x="0" y="0"/>
+          <a:chExt cx="0" cy="0"/>
+        </a:xfrm>
+      </p:grpSpPr>
+      <p:sp>
+        <p:nvSpPr>
+          <p:cNvPr id="4" name="Title 1">
+            <a:extLst>
+              <a:ext uri="{FF2B5EF4-FFF2-40B4-BE49-F238E27FC236}">
+                <a16:creationId xmlns:a16="http://schemas.microsoft.com/office/drawing/2014/main" id="{F9ED8BE6-F7AC-4FD8-8FA8-8C683A7C2F62}"/>
+              </a:ext>
+            </a:extLst>
+          </p:cNvPr>
+          <p:cNvSpPr>
+            <a:spLocks noGrp="1"/>
+          </p:cNvSpPr>
+          <p:nvPr>
+            <p:ph type="title"/>
+          </p:nvPr>
+        </p:nvSpPr>
+        <p:spPr>
+          <a:xfrm>
+            <a:off x="949040" y="365125"/>
+            <a:ext cx="11242960" cy="1325563"/>
+          </a:xfrm>
+        </p:spPr>
+        <p:txBody>
+          <a:bodyPr/>
+          <a:lstStyle/>
+          <a:p>
+            <a:r>
+              <a:rPr lang="en-GB" dirty="0">
+                <a:solidFill>
+                  <a:schemeClr val="bg1">
+                    <a:lumMod val="95000"/>
+                  </a:schemeClr>
+                </a:solidFill>
+                <a:latin typeface="Arial Nova Light" panose="020B0304020202020204" pitchFamily="34" charset="0"/>
+              </a:rPr>
+              <a:t>Pyrolysis</a:t>
+            </a:r>
+          </a:p>
+        </p:txBody>
+      </p:sp>
+      <p:sp>
+        <p:nvSpPr>
+          <p:cNvPr id="6" name="Content Placeholder 2">
+            <a:extLst>
+              <a:ext uri="{FF2B5EF4-FFF2-40B4-BE49-F238E27FC236}">
+                <a16:creationId xmlns:a16="http://schemas.microsoft.com/office/drawing/2014/main" id="{058630E6-31AF-4451-B084-C9809D0DA4E8}"/>
+              </a:ext>
+            </a:extLst>
+          </p:cNvPr>
+          <p:cNvSpPr>
+            <a:spLocks noGrp="1"/>
+          </p:cNvSpPr>
+          <p:nvPr>
+            <p:ph idx="1"/>
+          </p:nvPr>
+        </p:nvSpPr>
+        <p:spPr>
+          <a:xfrm>
+            <a:off x="949040" y="1825624"/>
+            <a:ext cx="11242960" cy="1233719"/>
+          </a:xfrm>
+        </p:spPr>
+        <p:txBody>
+          <a:bodyPr>
+            <a:normAutofit/>
+          </a:bodyPr>
+          <a:lstStyle/>
+          <a:p>
+            <a:r>
+              <a:rPr lang="en-GB" dirty="0">
+                <a:solidFill>
+                  <a:schemeClr val="bg1">
+                    <a:lumMod val="95000"/>
+                  </a:schemeClr>
+                </a:solidFill>
+                <a:latin typeface="Arial Nova Light" panose="020B0304020202020204" pitchFamily="34" charset="0"/>
+              </a:rPr>
+              <a:t>Rapid heating -&gt; higher volatiles (more liquids)</a:t>
+            </a:r>
+          </a:p>
+          <a:p>
+            <a:r>
+              <a:rPr lang="en-GB" dirty="0">
+                <a:solidFill>
+                  <a:schemeClr val="bg1">
+                    <a:lumMod val="95000"/>
+                  </a:schemeClr>
+                </a:solidFill>
+                <a:latin typeface="Arial Nova Light" panose="020B0304020202020204" pitchFamily="34" charset="0"/>
+              </a:rPr>
+              <a:t>Low temperatures -&gt; greater amount of char, gas yield decreases</a:t>
+            </a:r>
+          </a:p>
+          <a:p>
+            <a:endParaRPr lang="en-GB" dirty="0">
+              <a:solidFill>
+                <a:schemeClr val="bg1">
+                  <a:lumMod val="95000"/>
+                </a:schemeClr>
+              </a:solidFill>
+              <a:latin typeface="Arial Nova Light" panose="020B0304020202020204" pitchFamily="34" charset="0"/>
+            </a:endParaRPr>
+          </a:p>
+        </p:txBody>
+      </p:sp>
+      <p:sp>
+        <p:nvSpPr>
+          <p:cNvPr id="5" name="Rectangle 4">
+            <a:extLst>
+              <a:ext uri="{FF2B5EF4-FFF2-40B4-BE49-F238E27FC236}">
+                <a16:creationId xmlns:a16="http://schemas.microsoft.com/office/drawing/2014/main" id="{F2E92AD1-EC6F-4108-9565-5EC0B41458C4}"/>
+              </a:ext>
+            </a:extLst>
+          </p:cNvPr>
+          <p:cNvSpPr/>
+          <p:nvPr/>
+        </p:nvSpPr>
+        <p:spPr>
+          <a:xfrm>
+            <a:off x="949040" y="6334780"/>
+            <a:ext cx="11242960" cy="523220"/>
+          </a:xfrm>
+          <a:prstGeom prst="rect">
+            <a:avLst/>
+          </a:prstGeom>
+        </p:spPr>
+        <p:txBody>
+          <a:bodyPr wrap="square">
+            <a:spAutoFit/>
+          </a:bodyPr>
+          <a:lstStyle/>
+          <a:p>
+            <a:pPr marL="304800" indent="-304800"/>
+            <a:r>
+              <a:rPr lang="en-GB" sz="1400" dirty="0" err="1">
+                <a:solidFill>
+                  <a:schemeClr val="bg1">
+                    <a:lumMod val="95000"/>
+                  </a:schemeClr>
+                </a:solidFill>
+                <a:latin typeface="Arial Nova Light" panose="020B0304020202020204" pitchFamily="34" charset="0"/>
+              </a:rPr>
+              <a:t>Basu</a:t>
+            </a:r>
+            <a:r>
+              <a:rPr lang="en-GB" sz="1400" dirty="0">
+                <a:solidFill>
+                  <a:schemeClr val="bg1">
+                    <a:lumMod val="95000"/>
+                  </a:schemeClr>
+                </a:solidFill>
+                <a:latin typeface="Arial Nova Light" panose="020B0304020202020204" pitchFamily="34" charset="0"/>
+              </a:rPr>
+              <a:t>, P. (2018). Biomass Gasification, Pyrolysis and </a:t>
+            </a:r>
+            <a:r>
+              <a:rPr lang="en-GB" sz="1400" dirty="0" err="1">
+                <a:solidFill>
+                  <a:schemeClr val="bg1">
+                    <a:lumMod val="95000"/>
+                  </a:schemeClr>
+                </a:solidFill>
+                <a:latin typeface="Arial Nova Light" panose="020B0304020202020204" pitchFamily="34" charset="0"/>
+              </a:rPr>
+              <a:t>Torrefaction</a:t>
+            </a:r>
+            <a:r>
+              <a:rPr lang="en-GB" sz="1400" dirty="0">
+                <a:solidFill>
+                  <a:schemeClr val="bg1">
+                    <a:lumMod val="95000"/>
+                  </a:schemeClr>
+                </a:solidFill>
+                <a:latin typeface="Arial Nova Light" panose="020B0304020202020204" pitchFamily="34" charset="0"/>
+              </a:rPr>
+              <a:t> - Practical Design and Theory (3rd Edition). Elsevier. Retrieved from https://app.knovel.com/hotlink/pdf/id:kt011PGVNJ/biomass-gasification/biomass-ga-historical</a:t>
+            </a:r>
+          </a:p>
+        </p:txBody>
+      </p:sp>
+      <p:pic>
+        <p:nvPicPr>
+          <p:cNvPr id="3" name="Picture 2">
+            <a:extLst>
+              <a:ext uri="{FF2B5EF4-FFF2-40B4-BE49-F238E27FC236}">
+                <a16:creationId xmlns:a16="http://schemas.microsoft.com/office/drawing/2014/main" id="{E8231BD3-B268-44AA-AEEE-9AE84C31AFA1}"/>
+              </a:ext>
+            </a:extLst>
+          </p:cNvPr>
+          <p:cNvPicPr>
+            <a:picLocks noChangeAspect="1"/>
+          </p:cNvPicPr>
+          <p:nvPr/>
+        </p:nvPicPr>
+        <p:blipFill>
+          <a:blip r:embed="rId2"/>
+          <a:stretch>
+            <a:fillRect/>
+          </a:stretch>
+        </p:blipFill>
+        <p:spPr>
+          <a:xfrm>
+            <a:off x="1295400" y="3059343"/>
+            <a:ext cx="4800600" cy="3000375"/>
+          </a:xfrm>
+          <a:prstGeom prst="rect">
+            <a:avLst/>
+          </a:prstGeom>
+        </p:spPr>
+      </p:pic>
+      <p:sp>
+        <p:nvSpPr>
+          <p:cNvPr id="7" name="Content Placeholder 2">
+            <a:extLst>
+              <a:ext uri="{FF2B5EF4-FFF2-40B4-BE49-F238E27FC236}">
+                <a16:creationId xmlns:a16="http://schemas.microsoft.com/office/drawing/2014/main" id="{AEA38D39-5E27-4655-B893-DC348B261AFB}"/>
+              </a:ext>
+            </a:extLst>
+          </p:cNvPr>
+          <p:cNvSpPr txBox="1">
+            <a:spLocks/>
+          </p:cNvSpPr>
+          <p:nvPr/>
+        </p:nvSpPr>
+        <p:spPr>
+          <a:xfrm>
+            <a:off x="6381404" y="2842953"/>
+            <a:ext cx="5810596" cy="3491827"/>
+          </a:xfrm>
+          <a:prstGeom prst="rect">
+            <a:avLst/>
+          </a:prstGeom>
+        </p:spPr>
+        <p:txBody>
+          <a:bodyPr vert="horz" lIns="91440" tIns="45720" rIns="91440" bIns="45720" rtlCol="0">
+            <a:normAutofit/>
+          </a:bodyPr>
+          <a:lstStyle>
+            <a:lvl1pPr marL="228600" indent="-228600" algn="l" defTabSz="914400" rtl="0" eaLnBrk="1" latinLnBrk="0" hangingPunct="1">
+              <a:lnSpc>
+                <a:spcPct val="90000"/>
+              </a:lnSpc>
+              <a:spcBef>
+                <a:spcPts val="1000"/>
+              </a:spcBef>
+              <a:buFont typeface="Arial" panose="020B0604020202020204" pitchFamily="34" charset="0"/>
+              <a:buChar char="•"/>
+              <a:defRPr sz="2800" kern="1200">
+                <a:solidFill>
+                  <a:schemeClr val="tx1"/>
+                </a:solidFill>
+                <a:latin typeface="+mn-lt"/>
+                <a:ea typeface="+mn-ea"/>
+                <a:cs typeface="+mn-cs"/>
+              </a:defRPr>
+            </a:lvl1pPr>
+            <a:lvl2pPr marL="685800" indent="-228600" algn="l" defTabSz="914400" rtl="0" eaLnBrk="1" latinLnBrk="0" hangingPunct="1">
+              <a:lnSpc>
+                <a:spcPct val="90000"/>
+              </a:lnSpc>
+              <a:spcBef>
+                <a:spcPts val="500"/>
+              </a:spcBef>
+              <a:buFont typeface="Arial" panose="020B0604020202020204" pitchFamily="34" charset="0"/>
+              <a:buChar char="•"/>
+              <a:defRPr sz="2400" kern="1200">
+                <a:solidFill>
+                  <a:schemeClr val="tx1"/>
+                </a:solidFill>
+                <a:latin typeface="+mn-lt"/>
+                <a:ea typeface="+mn-ea"/>
+                <a:cs typeface="+mn-cs"/>
+              </a:defRPr>
+            </a:lvl2pPr>
+            <a:lvl3pPr marL="1143000" indent="-228600" algn="l" defTabSz="914400" rtl="0" eaLnBrk="1" latinLnBrk="0" hangingPunct="1">
+              <a:lnSpc>
+                <a:spcPct val="90000"/>
+              </a:lnSpc>
+              <a:spcBef>
+                <a:spcPts val="500"/>
+              </a:spcBef>
+              <a:buFont typeface="Arial" panose="020B0604020202020204" pitchFamily="34" charset="0"/>
+              <a:buChar char="•"/>
+              <a:defRPr sz="2000" kern="1200">
+                <a:solidFill>
+                  <a:schemeClr val="tx1"/>
+                </a:solidFill>
+                <a:latin typeface="+mn-lt"/>
+                <a:ea typeface="+mn-ea"/>
+                <a:cs typeface="+mn-cs"/>
+              </a:defRPr>
+            </a:lvl3pPr>
+            <a:lvl4pPr marL="1600200" indent="-228600" algn="l" defTabSz="914400" rtl="0" eaLnBrk="1" latinLnBrk="0" hangingPunct="1">
+              <a:lnSpc>
+                <a:spcPct val="90000"/>
+              </a:lnSpc>
+              <a:spcBef>
+                <a:spcPts val="500"/>
+              </a:spcBef>
+              <a:buFont typeface="Arial" panose="020B0604020202020204" pitchFamily="34" charset="0"/>
+              <a:buChar char="•"/>
+              <a:defRPr sz="1800" kern="1200">
+                <a:solidFill>
+                  <a:schemeClr val="tx1"/>
+                </a:solidFill>
+                <a:latin typeface="+mn-lt"/>
+                <a:ea typeface="+mn-ea"/>
+                <a:cs typeface="+mn-cs"/>
+              </a:defRPr>
+            </a:lvl4pPr>
+            <a:lvl5pPr marL="2057400" indent="-228600" algn="l" defTabSz="914400" rtl="0" eaLnBrk="1" latinLnBrk="0" hangingPunct="1">
+              <a:lnSpc>
+                <a:spcPct val="90000"/>
+              </a:lnSpc>
+              <a:spcBef>
+                <a:spcPts val="500"/>
+              </a:spcBef>
+              <a:buFont typeface="Arial" panose="020B0604020202020204" pitchFamily="34" charset="0"/>
+              <a:buChar char="•"/>
+              <a:defRPr sz="1800" kern="1200">
+                <a:solidFill>
+                  <a:schemeClr val="tx1"/>
+                </a:solidFill>
+                <a:latin typeface="+mn-lt"/>
+                <a:ea typeface="+mn-ea"/>
+                <a:cs typeface="+mn-cs"/>
+              </a:defRPr>
+            </a:lvl5pPr>
+            <a:lvl6pPr marL="2514600" indent="-228600" algn="l" defTabSz="914400" rtl="0" eaLnBrk="1" latinLnBrk="0" hangingPunct="1">
+              <a:lnSpc>
+                <a:spcPct val="90000"/>
+              </a:lnSpc>
+              <a:spcBef>
+                <a:spcPts val="500"/>
+              </a:spcBef>
+              <a:buFont typeface="Arial" panose="020B0604020202020204" pitchFamily="34" charset="0"/>
+              <a:buChar char="•"/>
+              <a:defRPr sz="1800" kern="1200">
+                <a:solidFill>
+                  <a:schemeClr val="tx1"/>
+                </a:solidFill>
+                <a:latin typeface="+mn-lt"/>
+                <a:ea typeface="+mn-ea"/>
+                <a:cs typeface="+mn-cs"/>
+              </a:defRPr>
+            </a:lvl6pPr>
+            <a:lvl7pPr marL="2971800" indent="-228600" algn="l" defTabSz="914400" rtl="0" eaLnBrk="1" latinLnBrk="0" hangingPunct="1">
+              <a:lnSpc>
+                <a:spcPct val="90000"/>
+              </a:lnSpc>
+              <a:spcBef>
+                <a:spcPts val="500"/>
+              </a:spcBef>
+              <a:buFont typeface="Arial" panose="020B0604020202020204" pitchFamily="34" charset="0"/>
+              <a:buChar char="•"/>
+              <a:defRPr sz="1800" kern="1200">
+                <a:solidFill>
+                  <a:schemeClr val="tx1"/>
+                </a:solidFill>
+                <a:latin typeface="+mn-lt"/>
+                <a:ea typeface="+mn-ea"/>
+                <a:cs typeface="+mn-cs"/>
+              </a:defRPr>
+            </a:lvl7pPr>
+            <a:lvl8pPr marL="3429000" indent="-228600" algn="l" defTabSz="914400" rtl="0" eaLnBrk="1" latinLnBrk="0" hangingPunct="1">
+              <a:lnSpc>
+                <a:spcPct val="90000"/>
+              </a:lnSpc>
+              <a:spcBef>
+                <a:spcPts val="500"/>
+              </a:spcBef>
+              <a:buFont typeface="Arial" panose="020B0604020202020204" pitchFamily="34" charset="0"/>
+              <a:buChar char="•"/>
+              <a:defRPr sz="1800" kern="1200">
+                <a:solidFill>
+                  <a:schemeClr val="tx1"/>
+                </a:solidFill>
+                <a:latin typeface="+mn-lt"/>
+                <a:ea typeface="+mn-ea"/>
+                <a:cs typeface="+mn-cs"/>
+              </a:defRPr>
+            </a:lvl8pPr>
+            <a:lvl9pPr marL="3886200" indent="-228600" algn="l" defTabSz="914400" rtl="0" eaLnBrk="1" latinLnBrk="0" hangingPunct="1">
+              <a:lnSpc>
+                <a:spcPct val="90000"/>
+              </a:lnSpc>
+              <a:spcBef>
+                <a:spcPts val="500"/>
+              </a:spcBef>
+              <a:buFont typeface="Arial" panose="020B0604020202020204" pitchFamily="34" charset="0"/>
+              <a:buChar char="•"/>
+              <a:defRPr sz="1800" kern="1200">
+                <a:solidFill>
+                  <a:schemeClr val="tx1"/>
+                </a:solidFill>
+                <a:latin typeface="+mn-lt"/>
+                <a:ea typeface="+mn-ea"/>
+                <a:cs typeface="+mn-cs"/>
+              </a:defRPr>
+            </a:lvl9pPr>
+          </a:lstStyle>
+          <a:p>
+            <a:r>
+              <a:rPr lang="en-GB" dirty="0">
+                <a:solidFill>
+                  <a:schemeClr val="bg1">
+                    <a:lumMod val="95000"/>
+                  </a:schemeClr>
+                </a:solidFill>
+                <a:latin typeface="Arial Nova Light" panose="020B0304020202020204" pitchFamily="34" charset="0"/>
+              </a:rPr>
+              <a:t>Small particles -&gt; higher liquid yield</a:t>
+            </a:r>
+          </a:p>
+          <a:p>
+            <a:endParaRPr lang="en-GB" dirty="0">
+              <a:solidFill>
+                <a:schemeClr val="bg1">
+                  <a:lumMod val="95000"/>
+                </a:schemeClr>
+              </a:solidFill>
+              <a:latin typeface="Arial Nova Light" panose="020B0304020202020204" pitchFamily="34" charset="0"/>
+            </a:endParaRPr>
+          </a:p>
+        </p:txBody>
+      </p:sp>
+    </p:spTree>
+    <p:extLst>
+      <p:ext uri="{BB962C8B-B14F-4D97-AF65-F5344CB8AC3E}">
+        <p14:creationId xmlns:p14="http://schemas.microsoft.com/office/powerpoint/2010/main" val="4191868023"/>
+      </p:ext>
+    </p:extLst>
+  </p:cSld>
+  <p:clrMapOvr>
+    <a:masterClrMapping/>
+  </p:clrMapOvr>
+</p:sld>
+</file>
+
+<file path=ppt/slides/slide12.xml><?xml version="1.0" encoding="utf-8"?>
+<p:sld xmlns:a="http://schemas.openxmlformats.org/drawingml/2006/main" xmlns:r="http://schemas.openxmlformats.org/officeDocument/2006/relationships" xmlns:p="http://schemas.openxmlformats.org/presentationml/2006/main">
+  <p:cSld>
+    <p:spTree>
+      <p:nvGrpSpPr>
+        <p:cNvPr id="1" name=""/>
+        <p:cNvGrpSpPr/>
+        <p:nvPr/>
+      </p:nvGrpSpPr>
+      <p:grpSpPr>
+        <a:xfrm>
+          <a:off x="0" y="0"/>
+          <a:ext cx="0" cy="0"/>
+          <a:chOff x="0" y="0"/>
+          <a:chExt cx="0" cy="0"/>
+        </a:xfrm>
+      </p:grpSpPr>
+      <p:sp>
+        <p:nvSpPr>
+          <p:cNvPr id="4" name="Title 1">
+            <a:extLst>
+              <a:ext uri="{FF2B5EF4-FFF2-40B4-BE49-F238E27FC236}">
+                <a16:creationId xmlns:a16="http://schemas.microsoft.com/office/drawing/2014/main" id="{F9ED8BE6-F7AC-4FD8-8FA8-8C683A7C2F62}"/>
+              </a:ext>
+            </a:extLst>
+          </p:cNvPr>
+          <p:cNvSpPr>
+            <a:spLocks noGrp="1"/>
+          </p:cNvSpPr>
+          <p:nvPr>
+            <p:ph type="title"/>
+          </p:nvPr>
+        </p:nvSpPr>
+        <p:spPr>
+          <a:xfrm>
+            <a:off x="949040" y="365125"/>
+            <a:ext cx="11242960" cy="1325563"/>
+          </a:xfrm>
+        </p:spPr>
+        <p:txBody>
+          <a:bodyPr/>
+          <a:lstStyle/>
+          <a:p>
+            <a:r>
+              <a:rPr lang="en-GB" dirty="0">
+                <a:solidFill>
+                  <a:schemeClr val="bg1">
+                    <a:lumMod val="95000"/>
+                  </a:schemeClr>
+                </a:solidFill>
+                <a:latin typeface="Arial Nova Light" panose="020B0304020202020204" pitchFamily="34" charset="0"/>
+              </a:rPr>
+              <a:t>References</a:t>
+            </a:r>
+          </a:p>
+        </p:txBody>
+      </p:sp>
+      <p:sp>
+        <p:nvSpPr>
+          <p:cNvPr id="6" name="Content Placeholder 2">
+            <a:extLst>
+              <a:ext uri="{FF2B5EF4-FFF2-40B4-BE49-F238E27FC236}">
+                <a16:creationId xmlns:a16="http://schemas.microsoft.com/office/drawing/2014/main" id="{058630E6-31AF-4451-B084-C9809D0DA4E8}"/>
+              </a:ext>
+            </a:extLst>
+          </p:cNvPr>
+          <p:cNvSpPr>
+            <a:spLocks noGrp="1"/>
+          </p:cNvSpPr>
+          <p:nvPr>
+            <p:ph idx="1"/>
+          </p:nvPr>
+        </p:nvSpPr>
+        <p:spPr>
+          <a:xfrm>
+            <a:off x="949040" y="1825624"/>
+            <a:ext cx="11242960" cy="5032375"/>
+          </a:xfrm>
+        </p:spPr>
+        <p:txBody>
+          <a:bodyPr>
+            <a:normAutofit/>
+          </a:bodyPr>
+          <a:lstStyle/>
+          <a:p>
+            <a:pPr marL="514350" indent="-514350">
+              <a:buFont typeface="+mj-lt"/>
+              <a:buAutoNum type="arabicPeriod"/>
+            </a:pPr>
+            <a:r>
+              <a:rPr lang="en-GB" dirty="0" err="1">
+                <a:solidFill>
+                  <a:schemeClr val="bg1">
+                    <a:lumMod val="95000"/>
+                  </a:schemeClr>
+                </a:solidFill>
+                <a:latin typeface="Arial Nova Light" panose="020B0304020202020204" pitchFamily="34" charset="0"/>
+              </a:rPr>
+              <a:t>Pramanick</a:t>
+            </a:r>
+            <a:r>
+              <a:rPr lang="en-GB" dirty="0">
+                <a:solidFill>
+                  <a:schemeClr val="bg1">
+                    <a:lumMod val="95000"/>
+                  </a:schemeClr>
+                </a:solidFill>
+                <a:latin typeface="Arial Nova Light" panose="020B0304020202020204" pitchFamily="34" charset="0"/>
+              </a:rPr>
+              <a:t>, B., Vazquez-Pinon, M., Torres-Castro, A., &amp; Martinez-</a:t>
+            </a:r>
+            <a:r>
+              <a:rPr lang="en-GB" dirty="0" err="1">
+                <a:solidFill>
+                  <a:schemeClr val="bg1">
+                    <a:lumMod val="95000"/>
+                  </a:schemeClr>
+                </a:solidFill>
+                <a:latin typeface="Arial Nova Light" panose="020B0304020202020204" pitchFamily="34" charset="0"/>
+              </a:rPr>
+              <a:t>Chapaa</a:t>
+            </a:r>
+            <a:r>
+              <a:rPr lang="en-GB" dirty="0">
+                <a:solidFill>
+                  <a:schemeClr val="bg1">
+                    <a:lumMod val="95000"/>
+                  </a:schemeClr>
+                </a:solidFill>
+                <a:latin typeface="Arial Nova Light" panose="020B0304020202020204" pitchFamily="34" charset="0"/>
+              </a:rPr>
+              <a:t>, S. O. (2018). Effect of pyrolysis process parameters on electrical, physical, chemical and electro-chemical properties of SU-8-derived carbon structures fabricated using the C-MEMS process. Materials Today: Proceedings, 5(3), 9669–9682. https://doi.org/10.1016/J.MATPR.2017.10.153</a:t>
+            </a:r>
+          </a:p>
+          <a:p>
+            <a:pPr marL="514350" indent="-514350">
+              <a:buFont typeface="+mj-lt"/>
+              <a:buAutoNum type="arabicPeriod"/>
+            </a:pPr>
+            <a:r>
+              <a:rPr lang="en-GB" dirty="0">
+                <a:solidFill>
+                  <a:schemeClr val="bg1">
+                    <a:lumMod val="95000"/>
+                  </a:schemeClr>
+                </a:solidFill>
+                <a:latin typeface="Arial Nova Light" panose="020B0304020202020204" pitchFamily="34" charset="0"/>
+              </a:rPr>
+              <a:t>Ulyanov, V., </a:t>
+            </a:r>
+            <a:r>
+              <a:rPr lang="en-GB" dirty="0" err="1">
+                <a:solidFill>
+                  <a:schemeClr val="bg1">
+                    <a:lumMod val="95000"/>
+                  </a:schemeClr>
+                </a:solidFill>
+                <a:latin typeface="Arial Nova Light" panose="020B0304020202020204" pitchFamily="34" charset="0"/>
+              </a:rPr>
+              <a:t>Koshelev</a:t>
+            </a:r>
+            <a:r>
+              <a:rPr lang="en-GB" dirty="0">
+                <a:solidFill>
+                  <a:schemeClr val="bg1">
+                    <a:lumMod val="95000"/>
+                  </a:schemeClr>
+                </a:solidFill>
+                <a:latin typeface="Arial Nova Light" panose="020B0304020202020204" pitchFamily="34" charset="0"/>
+              </a:rPr>
+              <a:t>, M., </a:t>
+            </a:r>
+            <a:r>
+              <a:rPr lang="en-GB" dirty="0" err="1">
+                <a:solidFill>
+                  <a:schemeClr val="bg1">
+                    <a:lumMod val="95000"/>
+                  </a:schemeClr>
+                </a:solidFill>
+                <a:latin typeface="Arial Nova Light" panose="020B0304020202020204" pitchFamily="34" charset="0"/>
+              </a:rPr>
+              <a:t>Kharchuk</a:t>
+            </a:r>
+            <a:r>
+              <a:rPr lang="en-GB" dirty="0">
+                <a:solidFill>
+                  <a:schemeClr val="bg1">
+                    <a:lumMod val="95000"/>
+                  </a:schemeClr>
+                </a:solidFill>
+                <a:latin typeface="Arial Nova Light" panose="020B0304020202020204" pitchFamily="34" charset="0"/>
+              </a:rPr>
+              <a:t>, S., </a:t>
+            </a:r>
+            <a:r>
+              <a:rPr lang="en-GB" dirty="0" err="1">
+                <a:solidFill>
+                  <a:schemeClr val="bg1">
+                    <a:lumMod val="95000"/>
+                  </a:schemeClr>
+                </a:solidFill>
+                <a:latin typeface="Arial Nova Light" panose="020B0304020202020204" pitchFamily="34" charset="0"/>
+              </a:rPr>
+              <a:t>Gulevskii</a:t>
+            </a:r>
+            <a:r>
+              <a:rPr lang="en-GB" dirty="0">
+                <a:solidFill>
+                  <a:schemeClr val="bg1">
+                    <a:lumMod val="95000"/>
+                  </a:schemeClr>
+                </a:solidFill>
+                <a:latin typeface="Arial Nova Light" panose="020B0304020202020204" pitchFamily="34" charset="0"/>
+              </a:rPr>
+              <a:t>, V., &amp; </a:t>
+            </a:r>
+            <a:r>
+              <a:rPr lang="en-GB" dirty="0" err="1">
+                <a:solidFill>
+                  <a:schemeClr val="bg1">
+                    <a:lumMod val="95000"/>
+                  </a:schemeClr>
+                </a:solidFill>
+                <a:latin typeface="Arial Nova Light" panose="020B0304020202020204" pitchFamily="34" charset="0"/>
+              </a:rPr>
+              <a:t>Timochkin</a:t>
+            </a:r>
+            <a:r>
+              <a:rPr lang="en-GB" dirty="0">
+                <a:solidFill>
+                  <a:schemeClr val="bg1">
+                    <a:lumMod val="95000"/>
+                  </a:schemeClr>
+                </a:solidFill>
+                <a:latin typeface="Arial Nova Light" panose="020B0304020202020204" pitchFamily="34" charset="0"/>
+              </a:rPr>
+              <a:t>, A. (2018). Study of the pyrolysis of solid organic polymers by their heating with metal melt. Petroleum Chemistry, 58(1), 68–75. https://doi.org/10.1134/S0965544118010140</a:t>
+            </a:r>
+          </a:p>
+          <a:p>
+            <a:endParaRPr lang="en-GB" dirty="0">
+              <a:solidFill>
+                <a:schemeClr val="bg1">
+                  <a:lumMod val="95000"/>
+                </a:schemeClr>
+              </a:solidFill>
+              <a:latin typeface="Arial Nova Light" panose="020B0304020202020204" pitchFamily="34" charset="0"/>
+            </a:endParaRPr>
+          </a:p>
+        </p:txBody>
+      </p:sp>
+    </p:spTree>
+    <p:extLst>
+      <p:ext uri="{BB962C8B-B14F-4D97-AF65-F5344CB8AC3E}">
+        <p14:creationId xmlns:p14="http://schemas.microsoft.com/office/powerpoint/2010/main" val="3604131991"/>
+      </p:ext>
+    </p:extLst>
+  </p:cSld>
+  <p:clrMapOvr>
+    <a:masterClrMapping/>
+  </p:clrMapOvr>
+</p:sld>
+</file>
+
 <file path=ppt/slides/slide2.xml><?xml version="1.0" encoding="utf-8"?>
 <p:sld xmlns:a="http://schemas.openxmlformats.org/drawingml/2006/main" xmlns:r="http://schemas.openxmlformats.org/officeDocument/2006/relationships" xmlns:p="http://schemas.openxmlformats.org/presentationml/2006/main">
   <p:cSld>
@@ -4040,7 +5205,7 @@
                 </a:solidFill>
                 <a:latin typeface="Arial Nova Light" panose="020B0304020202020204" pitchFamily="34" charset="0"/>
               </a:rPr>
-              <a:t>My Thesis Overview	: ~10min</a:t>
+              <a:t>My Thesis Overview	: ~5min</a:t>
             </a:r>
           </a:p>
           <a:p>
@@ -4558,6 +5723,58 @@
           </a:effectLst>
         </p:spPr>
       </p:pic>
+      <p:sp>
+        <p:nvSpPr>
+          <p:cNvPr id="2" name="Rectangle 1">
+            <a:extLst>
+              <a:ext uri="{FF2B5EF4-FFF2-40B4-BE49-F238E27FC236}">
+                <a16:creationId xmlns:a16="http://schemas.microsoft.com/office/drawing/2014/main" id="{B47F02D3-7ADF-4C42-9EC9-7B6178B14E10}"/>
+              </a:ext>
+            </a:extLst>
+          </p:cNvPr>
+          <p:cNvSpPr/>
+          <p:nvPr/>
+        </p:nvSpPr>
+        <p:spPr>
+          <a:xfrm>
+            <a:off x="7890935" y="1935457"/>
+            <a:ext cx="1507067" cy="609600"/>
+          </a:xfrm>
+          <a:prstGeom prst="rect">
+            <a:avLst/>
+          </a:prstGeom>
+          <a:noFill/>
+          <a:ln w="66675">
+            <a:solidFill>
+              <a:srgbClr val="FFC000"/>
+            </a:solidFill>
+          </a:ln>
+        </p:spPr>
+        <p:style>
+          <a:lnRef idx="2">
+            <a:schemeClr val="accent1">
+              <a:shade val="50000"/>
+            </a:schemeClr>
+          </a:lnRef>
+          <a:fillRef idx="1">
+            <a:schemeClr val="accent1"/>
+          </a:fillRef>
+          <a:effectRef idx="0">
+            <a:schemeClr val="accent1"/>
+          </a:effectRef>
+          <a:fontRef idx="minor">
+            <a:schemeClr val="lt1"/>
+          </a:fontRef>
+        </p:style>
+        <p:txBody>
+          <a:bodyPr rtlCol="0" anchor="ctr"/>
+          <a:lstStyle/>
+          <a:p>
+            <a:pPr algn="ctr"/>
+            <a:endParaRPr lang="en-GB"/>
+          </a:p>
+        </p:txBody>
+      </p:sp>
     </p:spTree>
     <p:extLst>
       <p:ext uri="{BB962C8B-B14F-4D97-AF65-F5344CB8AC3E}">
@@ -4808,6 +6025,593 @@
                 </a:solidFill>
                 <a:latin typeface="Arial Nova Light" panose="020B0304020202020204" pitchFamily="34" charset="0"/>
               </a:rPr>
+              <a:t>Pyrolysis</a:t>
+            </a:r>
+          </a:p>
+        </p:txBody>
+      </p:sp>
+      <p:sp>
+        <p:nvSpPr>
+          <p:cNvPr id="6" name="Content Placeholder 2">
+            <a:extLst>
+              <a:ext uri="{FF2B5EF4-FFF2-40B4-BE49-F238E27FC236}">
+                <a16:creationId xmlns:a16="http://schemas.microsoft.com/office/drawing/2014/main" id="{058630E6-31AF-4451-B084-C9809D0DA4E8}"/>
+              </a:ext>
+            </a:extLst>
+          </p:cNvPr>
+          <p:cNvSpPr>
+            <a:spLocks noGrp="1"/>
+          </p:cNvSpPr>
+          <p:nvPr>
+            <p:ph idx="1"/>
+          </p:nvPr>
+        </p:nvSpPr>
+        <p:spPr>
+          <a:xfrm>
+            <a:off x="949040" y="1825624"/>
+            <a:ext cx="11242960" cy="4509155"/>
+          </a:xfrm>
+        </p:spPr>
+        <p:txBody>
+          <a:bodyPr>
+            <a:normAutofit/>
+          </a:bodyPr>
+          <a:lstStyle/>
+          <a:p>
+            <a:r>
+              <a:rPr lang="en-GB" dirty="0">
+                <a:solidFill>
+                  <a:schemeClr val="bg1">
+                    <a:lumMod val="95000"/>
+                  </a:schemeClr>
+                </a:solidFill>
+                <a:latin typeface="Arial Nova Light" panose="020B0304020202020204" pitchFamily="34" charset="0"/>
+              </a:rPr>
+              <a:t>Is the chemical decomposition of any organic polymer by heating in an oxygen-free environment</a:t>
+            </a:r>
+          </a:p>
+          <a:p>
+            <a:pPr marL="0" indent="0">
+              <a:buNone/>
+            </a:pPr>
+            <a:endParaRPr lang="en-GB" dirty="0">
+              <a:solidFill>
+                <a:schemeClr val="bg1">
+                  <a:lumMod val="95000"/>
+                </a:schemeClr>
+              </a:solidFill>
+              <a:latin typeface="Arial Nova Light" panose="020B0304020202020204" pitchFamily="34" charset="0"/>
+            </a:endParaRPr>
+          </a:p>
+          <a:p>
+            <a:r>
+              <a:rPr lang="en-GB" dirty="0">
+                <a:solidFill>
+                  <a:schemeClr val="bg1">
+                    <a:lumMod val="95000"/>
+                  </a:schemeClr>
+                </a:solidFill>
+                <a:latin typeface="Arial Nova Light" panose="020B0304020202020204" pitchFamily="34" charset="0"/>
+              </a:rPr>
+              <a:t>This degradation technique can lead to the formation condensable gases and carbonized materials</a:t>
+            </a:r>
+          </a:p>
+          <a:p>
+            <a:endParaRPr lang="en-GB" dirty="0">
+              <a:solidFill>
+                <a:schemeClr val="bg1">
+                  <a:lumMod val="95000"/>
+                </a:schemeClr>
+              </a:solidFill>
+              <a:latin typeface="Arial Nova Light" panose="020B0304020202020204" pitchFamily="34" charset="0"/>
+            </a:endParaRPr>
+          </a:p>
+        </p:txBody>
+      </p:sp>
+      <p:sp>
+        <p:nvSpPr>
+          <p:cNvPr id="5" name="Rectangle 4">
+            <a:extLst>
+              <a:ext uri="{FF2B5EF4-FFF2-40B4-BE49-F238E27FC236}">
+                <a16:creationId xmlns:a16="http://schemas.microsoft.com/office/drawing/2014/main" id="{F2E92AD1-EC6F-4108-9565-5EC0B41458C4}"/>
+              </a:ext>
+            </a:extLst>
+          </p:cNvPr>
+          <p:cNvSpPr/>
+          <p:nvPr/>
+        </p:nvSpPr>
+        <p:spPr>
+          <a:xfrm>
+            <a:off x="949040" y="6334780"/>
+            <a:ext cx="11242960" cy="523220"/>
+          </a:xfrm>
+          <a:prstGeom prst="rect">
+            <a:avLst/>
+          </a:prstGeom>
+        </p:spPr>
+        <p:txBody>
+          <a:bodyPr wrap="square">
+            <a:spAutoFit/>
+          </a:bodyPr>
+          <a:lstStyle/>
+          <a:p>
+            <a:pPr marL="304800" indent="-304800"/>
+            <a:r>
+              <a:rPr lang="en-GB" sz="1400" dirty="0" err="1">
+                <a:solidFill>
+                  <a:schemeClr val="bg1">
+                    <a:lumMod val="95000"/>
+                  </a:schemeClr>
+                </a:solidFill>
+                <a:latin typeface="Arial Nova Light" panose="020B0304020202020204" pitchFamily="34" charset="0"/>
+              </a:rPr>
+              <a:t>Basu</a:t>
+            </a:r>
+            <a:r>
+              <a:rPr lang="en-GB" sz="1400" dirty="0">
+                <a:solidFill>
+                  <a:schemeClr val="bg1">
+                    <a:lumMod val="95000"/>
+                  </a:schemeClr>
+                </a:solidFill>
+                <a:latin typeface="Arial Nova Light" panose="020B0304020202020204" pitchFamily="34" charset="0"/>
+              </a:rPr>
+              <a:t>, P. (2018). Biomass Gasification, Pyrolysis and </a:t>
+            </a:r>
+            <a:r>
+              <a:rPr lang="en-GB" sz="1400" dirty="0" err="1">
+                <a:solidFill>
+                  <a:schemeClr val="bg1">
+                    <a:lumMod val="95000"/>
+                  </a:schemeClr>
+                </a:solidFill>
+                <a:latin typeface="Arial Nova Light" panose="020B0304020202020204" pitchFamily="34" charset="0"/>
+              </a:rPr>
+              <a:t>Torrefaction</a:t>
+            </a:r>
+            <a:r>
+              <a:rPr lang="en-GB" sz="1400" dirty="0">
+                <a:solidFill>
+                  <a:schemeClr val="bg1">
+                    <a:lumMod val="95000"/>
+                  </a:schemeClr>
+                </a:solidFill>
+                <a:latin typeface="Arial Nova Light" panose="020B0304020202020204" pitchFamily="34" charset="0"/>
+              </a:rPr>
+              <a:t> - Practical Design and Theory (3rd Edition). Elsevier. Retrieved from https://app.knovel.com/hotlink/pdf/id:kt011PGVNJ/biomass-gasification/biomass-ga-historical</a:t>
+            </a:r>
+          </a:p>
+        </p:txBody>
+      </p:sp>
+      <p:pic>
+        <p:nvPicPr>
+          <p:cNvPr id="2" name="Picture 1">
+            <a:extLst>
+              <a:ext uri="{FF2B5EF4-FFF2-40B4-BE49-F238E27FC236}">
+                <a16:creationId xmlns:a16="http://schemas.microsoft.com/office/drawing/2014/main" id="{E377F344-DB50-4440-91A5-80B84A927522}"/>
+              </a:ext>
+            </a:extLst>
+          </p:cNvPr>
+          <p:cNvPicPr>
+            <a:picLocks noChangeAspect="1"/>
+          </p:cNvPicPr>
+          <p:nvPr/>
+        </p:nvPicPr>
+        <p:blipFill>
+          <a:blip r:embed="rId2"/>
+          <a:stretch>
+            <a:fillRect/>
+          </a:stretch>
+        </p:blipFill>
+        <p:spPr>
+          <a:xfrm>
+            <a:off x="3090840" y="4760681"/>
+            <a:ext cx="6959360" cy="758969"/>
+          </a:xfrm>
+          <a:prstGeom prst="rect">
+            <a:avLst/>
+          </a:prstGeom>
+        </p:spPr>
+      </p:pic>
+    </p:spTree>
+    <p:extLst>
+      <p:ext uri="{BB962C8B-B14F-4D97-AF65-F5344CB8AC3E}">
+        <p14:creationId xmlns:p14="http://schemas.microsoft.com/office/powerpoint/2010/main" val="2598307304"/>
+      </p:ext>
+    </p:extLst>
+  </p:cSld>
+  <p:clrMapOvr>
+    <a:masterClrMapping/>
+  </p:clrMapOvr>
+</p:sld>
+</file>
+
+<file path=ppt/slides/slide7.xml><?xml version="1.0" encoding="utf-8"?>
+<p:sld xmlns:a="http://schemas.openxmlformats.org/drawingml/2006/main" xmlns:r="http://schemas.openxmlformats.org/officeDocument/2006/relationships" xmlns:p="http://schemas.openxmlformats.org/presentationml/2006/main">
+  <p:cSld>
+    <p:spTree>
+      <p:nvGrpSpPr>
+        <p:cNvPr id="1" name=""/>
+        <p:cNvGrpSpPr/>
+        <p:nvPr/>
+      </p:nvGrpSpPr>
+      <p:grpSpPr>
+        <a:xfrm>
+          <a:off x="0" y="0"/>
+          <a:ext cx="0" cy="0"/>
+          <a:chOff x="0" y="0"/>
+          <a:chExt cx="0" cy="0"/>
+        </a:xfrm>
+      </p:grpSpPr>
+      <p:sp>
+        <p:nvSpPr>
+          <p:cNvPr id="4" name="Title 1">
+            <a:extLst>
+              <a:ext uri="{FF2B5EF4-FFF2-40B4-BE49-F238E27FC236}">
+                <a16:creationId xmlns:a16="http://schemas.microsoft.com/office/drawing/2014/main" id="{F9ED8BE6-F7AC-4FD8-8FA8-8C683A7C2F62}"/>
+              </a:ext>
+            </a:extLst>
+          </p:cNvPr>
+          <p:cNvSpPr>
+            <a:spLocks noGrp="1"/>
+          </p:cNvSpPr>
+          <p:nvPr>
+            <p:ph type="title"/>
+          </p:nvPr>
+        </p:nvSpPr>
+        <p:spPr>
+          <a:xfrm>
+            <a:off x="949040" y="365125"/>
+            <a:ext cx="11242960" cy="1325563"/>
+          </a:xfrm>
+        </p:spPr>
+        <p:txBody>
+          <a:bodyPr/>
+          <a:lstStyle/>
+          <a:p>
+            <a:r>
+              <a:rPr lang="en-GB" dirty="0">
+                <a:solidFill>
+                  <a:schemeClr val="bg1">
+                    <a:lumMod val="95000"/>
+                  </a:schemeClr>
+                </a:solidFill>
+                <a:latin typeface="Arial Nova Light" panose="020B0304020202020204" pitchFamily="34" charset="0"/>
+              </a:rPr>
+              <a:t>Pyrolysis Parameters to be investigated</a:t>
+            </a:r>
+          </a:p>
+        </p:txBody>
+      </p:sp>
+      <mc:AlternateContent xmlns:mc="http://schemas.openxmlformats.org/markup-compatibility/2006">
+        <mc:Choice xmlns:a14="http://schemas.microsoft.com/office/drawing/2010/main" Requires="a14">
+          <p:sp>
+            <p:nvSpPr>
+              <p:cNvPr id="6" name="Content Placeholder 2">
+                <a:extLst>
+                  <a:ext uri="{FF2B5EF4-FFF2-40B4-BE49-F238E27FC236}">
+                    <a16:creationId xmlns:a16="http://schemas.microsoft.com/office/drawing/2014/main" id="{058630E6-31AF-4451-B084-C9809D0DA4E8}"/>
+                  </a:ext>
+                </a:extLst>
+              </p:cNvPr>
+              <p:cNvSpPr>
+                <a:spLocks noGrp="1"/>
+              </p:cNvSpPr>
+              <p:nvPr>
+                <p:ph idx="1"/>
+              </p:nvPr>
+            </p:nvSpPr>
+            <p:spPr>
+              <a:xfrm>
+                <a:off x="949040" y="1825624"/>
+                <a:ext cx="11242960" cy="4509155"/>
+              </a:xfrm>
+            </p:spPr>
+            <p:txBody>
+              <a:bodyPr>
+                <a:normAutofit/>
+              </a:bodyPr>
+              <a:lstStyle/>
+              <a:p>
+                <a:r>
+                  <a:rPr lang="en-GB" dirty="0">
+                    <a:solidFill>
+                      <a:schemeClr val="bg1">
+                        <a:lumMod val="95000"/>
+                      </a:schemeClr>
+                    </a:solidFill>
+                    <a:latin typeface="Arial Nova Light" panose="020B0304020202020204" pitchFamily="34" charset="0"/>
+                  </a:rPr>
+                  <a:t>Maximum Pyrolysis Temperature</a:t>
+                </a:r>
+              </a:p>
+              <a:p>
+                <a:r>
+                  <a:rPr lang="en-GB" dirty="0">
+                    <a:solidFill>
+                      <a:schemeClr val="bg1">
+                        <a:lumMod val="95000"/>
+                      </a:schemeClr>
+                    </a:solidFill>
+                    <a:latin typeface="Arial Nova Light" panose="020B0304020202020204" pitchFamily="34" charset="0"/>
+                  </a:rPr>
+                  <a:t>Temperature Ramp Rate</a:t>
+                </a:r>
+              </a:p>
+              <a:p>
+                <a:r>
+                  <a:rPr lang="en-GB" dirty="0">
+                    <a:solidFill>
+                      <a:schemeClr val="bg1">
+                        <a:lumMod val="95000"/>
+                      </a:schemeClr>
+                    </a:solidFill>
+                    <a:latin typeface="Arial Nova Light" panose="020B0304020202020204" pitchFamily="34" charset="0"/>
+                  </a:rPr>
+                  <a:t>Gas (</a:t>
+                </a:r>
+                <a14:m>
+                  <m:oMath xmlns:m="http://schemas.openxmlformats.org/officeDocument/2006/math">
+                    <m:sSub>
+                      <m:sSubPr>
+                        <m:ctrlPr>
+                          <a:rPr lang="es-MX" i="1">
+                            <a:solidFill>
+                              <a:schemeClr val="bg1">
+                                <a:lumMod val="95000"/>
+                              </a:schemeClr>
+                            </a:solidFill>
+                            <a:latin typeface="Cambria Math" panose="02040503050406030204" pitchFamily="18" charset="0"/>
+                          </a:rPr>
+                        </m:ctrlPr>
+                      </m:sSubPr>
+                      <m:e>
+                        <m:r>
+                          <a:rPr lang="es-MX" b="0" i="1" smtClean="0">
+                            <a:solidFill>
+                              <a:schemeClr val="bg1">
+                                <a:lumMod val="95000"/>
+                              </a:schemeClr>
+                            </a:solidFill>
+                            <a:latin typeface="Cambria Math" panose="02040503050406030204" pitchFamily="18" charset="0"/>
+                          </a:rPr>
+                          <m:t>𝑁</m:t>
+                        </m:r>
+                      </m:e>
+                      <m:sub>
+                        <m:r>
+                          <a:rPr lang="es-MX" i="1">
+                            <a:solidFill>
+                              <a:schemeClr val="bg1">
+                                <a:lumMod val="95000"/>
+                              </a:schemeClr>
+                            </a:solidFill>
+                            <a:latin typeface="Cambria Math" panose="02040503050406030204" pitchFamily="18" charset="0"/>
+                          </a:rPr>
+                          <m:t>2</m:t>
+                        </m:r>
+                      </m:sub>
+                    </m:sSub>
+                  </m:oMath>
+                </a14:m>
+                <a:r>
+                  <a:rPr lang="en-GB" dirty="0">
+                    <a:solidFill>
+                      <a:schemeClr val="bg1">
+                        <a:lumMod val="95000"/>
+                      </a:schemeClr>
+                    </a:solidFill>
+                    <a:latin typeface="Arial Nova Light" panose="020B0304020202020204" pitchFamily="34" charset="0"/>
+                  </a:rPr>
+                  <a:t>) </a:t>
+                </a:r>
+                <a:r>
+                  <a:rPr lang="en-GB">
+                    <a:solidFill>
+                      <a:schemeClr val="bg1">
+                        <a:lumMod val="95000"/>
+                      </a:schemeClr>
+                    </a:solidFill>
+                    <a:latin typeface="Arial Nova Light" panose="020B0304020202020204" pitchFamily="34" charset="0"/>
+                  </a:rPr>
+                  <a:t>flow rate</a:t>
+                </a:r>
+                <a:endParaRPr lang="en-GB" dirty="0">
+                  <a:solidFill>
+                    <a:schemeClr val="bg1">
+                      <a:lumMod val="95000"/>
+                    </a:schemeClr>
+                  </a:solidFill>
+                  <a:latin typeface="Arial Nova Light" panose="020B0304020202020204" pitchFamily="34" charset="0"/>
+                </a:endParaRPr>
+              </a:p>
+            </p:txBody>
+          </p:sp>
+        </mc:Choice>
+        <mc:Fallback>
+          <p:sp>
+            <p:nvSpPr>
+              <p:cNvPr id="6" name="Content Placeholder 2">
+                <a:extLst>
+                  <a:ext uri="{FF2B5EF4-FFF2-40B4-BE49-F238E27FC236}">
+                    <a16:creationId xmlns:a16="http://schemas.microsoft.com/office/drawing/2014/main" id="{058630E6-31AF-4451-B084-C9809D0DA4E8}"/>
+                  </a:ext>
+                </a:extLst>
+              </p:cNvPr>
+              <p:cNvSpPr>
+                <a:spLocks noGrp="1" noRot="1" noChangeAspect="1" noMove="1" noResize="1" noEditPoints="1" noAdjustHandles="1" noChangeArrowheads="1" noChangeShapeType="1" noTextEdit="1"/>
+              </p:cNvSpPr>
+              <p:nvPr>
+                <p:ph idx="1"/>
+              </p:nvPr>
+            </p:nvSpPr>
+            <p:spPr>
+              <a:xfrm>
+                <a:off x="949040" y="1825624"/>
+                <a:ext cx="11242960" cy="4509155"/>
+              </a:xfrm>
+              <a:blipFill>
+                <a:blip r:embed="rId2"/>
+                <a:stretch>
+                  <a:fillRect l="-976" t="-2297"/>
+                </a:stretch>
+              </a:blipFill>
+            </p:spPr>
+            <p:txBody>
+              <a:bodyPr/>
+              <a:lstStyle/>
+              <a:p>
+                <a:r>
+                  <a:rPr lang="en-GB">
+                    <a:noFill/>
+                  </a:rPr>
+                  <a:t> </a:t>
+                </a:r>
+              </a:p>
+            </p:txBody>
+          </p:sp>
+        </mc:Fallback>
+      </mc:AlternateContent>
+      <p:sp>
+        <p:nvSpPr>
+          <p:cNvPr id="7" name="Rectangle 6">
+            <a:extLst>
+              <a:ext uri="{FF2B5EF4-FFF2-40B4-BE49-F238E27FC236}">
+                <a16:creationId xmlns:a16="http://schemas.microsoft.com/office/drawing/2014/main" id="{017719D5-6169-4770-9360-3AF88034324B}"/>
+              </a:ext>
+            </a:extLst>
+          </p:cNvPr>
+          <p:cNvSpPr/>
+          <p:nvPr/>
+        </p:nvSpPr>
+        <p:spPr>
+          <a:xfrm>
+            <a:off x="942833" y="6119336"/>
+            <a:ext cx="11242960" cy="738664"/>
+          </a:xfrm>
+          <a:prstGeom prst="rect">
+            <a:avLst/>
+          </a:prstGeom>
+        </p:spPr>
+        <p:txBody>
+          <a:bodyPr wrap="square">
+            <a:spAutoFit/>
+          </a:bodyPr>
+          <a:lstStyle/>
+          <a:p>
+            <a:pPr marL="304800" indent="-304800"/>
+            <a:r>
+              <a:rPr lang="en-GB" sz="1400" dirty="0" err="1">
+                <a:solidFill>
+                  <a:schemeClr val="bg1">
+                    <a:lumMod val="95000"/>
+                  </a:schemeClr>
+                </a:solidFill>
+                <a:latin typeface="Arial Nova Light" panose="020B0304020202020204" pitchFamily="34" charset="0"/>
+              </a:rPr>
+              <a:t>Pramanick</a:t>
+            </a:r>
+            <a:r>
+              <a:rPr lang="en-GB" sz="1400" dirty="0">
+                <a:solidFill>
+                  <a:schemeClr val="bg1">
+                    <a:lumMod val="95000"/>
+                  </a:schemeClr>
+                </a:solidFill>
+                <a:latin typeface="Arial Nova Light" panose="020B0304020202020204" pitchFamily="34" charset="0"/>
+              </a:rPr>
+              <a:t>, B., Vazquez-Pinon, M., Torres-Castro, A., &amp; Martinez-</a:t>
+            </a:r>
+            <a:r>
+              <a:rPr lang="en-GB" sz="1400" dirty="0" err="1">
+                <a:solidFill>
+                  <a:schemeClr val="bg1">
+                    <a:lumMod val="95000"/>
+                  </a:schemeClr>
+                </a:solidFill>
+                <a:latin typeface="Arial Nova Light" panose="020B0304020202020204" pitchFamily="34" charset="0"/>
+              </a:rPr>
+              <a:t>Chapaa</a:t>
+            </a:r>
+            <a:r>
+              <a:rPr lang="en-GB" sz="1400" dirty="0">
+                <a:solidFill>
+                  <a:schemeClr val="bg1">
+                    <a:lumMod val="95000"/>
+                  </a:schemeClr>
+                </a:solidFill>
+                <a:latin typeface="Arial Nova Light" panose="020B0304020202020204" pitchFamily="34" charset="0"/>
+              </a:rPr>
+              <a:t>, S. O. (2018). Effect of pyrolysis process parameters on electrical, physical, chemical and electro-chemical properties of SU-8-derived carbon structures fabricated using the C-MEMS process. Materials Today: Proceedings, 5(3), 9669–9682. https://doi.org/10.1016/J.MATPR.2017.10.153</a:t>
+            </a:r>
+          </a:p>
+        </p:txBody>
+      </p:sp>
+    </p:spTree>
+    <p:extLst>
+      <p:ext uri="{BB962C8B-B14F-4D97-AF65-F5344CB8AC3E}">
+        <p14:creationId xmlns:p14="http://schemas.microsoft.com/office/powerpoint/2010/main" val="3853310930"/>
+      </p:ext>
+    </p:extLst>
+  </p:cSld>
+  <p:clrMapOvr>
+    <a:masterClrMapping/>
+  </p:clrMapOvr>
+</p:sld>
+</file>
+
+<file path=ppt/slides/slide8.xml><?xml version="1.0" encoding="utf-8"?>
+<p:sld xmlns:a="http://schemas.openxmlformats.org/drawingml/2006/main" xmlns:r="http://schemas.openxmlformats.org/officeDocument/2006/relationships" xmlns:p="http://schemas.openxmlformats.org/presentationml/2006/main">
+  <p:cSld>
+    <p:spTree>
+      <p:nvGrpSpPr>
+        <p:cNvPr id="1" name=""/>
+        <p:cNvGrpSpPr/>
+        <p:nvPr/>
+      </p:nvGrpSpPr>
+      <p:grpSpPr>
+        <a:xfrm>
+          <a:off x="0" y="0"/>
+          <a:ext cx="0" cy="0"/>
+          <a:chOff x="0" y="0"/>
+          <a:chExt cx="0" cy="0"/>
+        </a:xfrm>
+      </p:grpSpPr>
+      <p:sp>
+        <p:nvSpPr>
+          <p:cNvPr id="4" name="Title 1">
+            <a:extLst>
+              <a:ext uri="{FF2B5EF4-FFF2-40B4-BE49-F238E27FC236}">
+                <a16:creationId xmlns:a16="http://schemas.microsoft.com/office/drawing/2014/main" id="{F9ED8BE6-F7AC-4FD8-8FA8-8C683A7C2F62}"/>
+              </a:ext>
+            </a:extLst>
+          </p:cNvPr>
+          <p:cNvSpPr>
+            <a:spLocks noGrp="1"/>
+          </p:cNvSpPr>
+          <p:nvPr>
+            <p:ph type="title"/>
+          </p:nvPr>
+        </p:nvSpPr>
+        <p:spPr>
+          <a:xfrm>
+            <a:off x="949040" y="365125"/>
+            <a:ext cx="11242960" cy="1325563"/>
+          </a:xfrm>
+        </p:spPr>
+        <p:txBody>
+          <a:bodyPr/>
+          <a:lstStyle/>
+          <a:p>
+            <a:r>
+              <a:rPr lang="en-GB" dirty="0">
+                <a:solidFill>
+                  <a:schemeClr val="bg1">
+                    <a:lumMod val="95000"/>
+                  </a:schemeClr>
+                </a:solidFill>
+                <a:latin typeface="Arial Nova Light" panose="020B0304020202020204" pitchFamily="34" charset="0"/>
+              </a:rPr>
               <a:t>Title</a:t>
             </a:r>
           </a:p>
@@ -5099,6 +6903,912 @@
     <p:extLst>
       <p:ext uri="{BB962C8B-B14F-4D97-AF65-F5344CB8AC3E}">
         <p14:creationId xmlns:p14="http://schemas.microsoft.com/office/powerpoint/2010/main" val="3893641512"/>
+      </p:ext>
+    </p:extLst>
+  </p:cSld>
+  <p:clrMapOvr>
+    <a:masterClrMapping/>
+  </p:clrMapOvr>
+</p:sld>
+</file>
+
+<file path=ppt/slides/slide9.xml><?xml version="1.0" encoding="utf-8"?>
+<p:sld xmlns:a="http://schemas.openxmlformats.org/drawingml/2006/main" xmlns:r="http://schemas.openxmlformats.org/officeDocument/2006/relationships" xmlns:p="http://schemas.openxmlformats.org/presentationml/2006/main">
+  <p:cSld>
+    <p:spTree>
+      <p:nvGrpSpPr>
+        <p:cNvPr id="1" name=""/>
+        <p:cNvGrpSpPr/>
+        <p:nvPr/>
+      </p:nvGrpSpPr>
+      <p:grpSpPr>
+        <a:xfrm>
+          <a:off x="0" y="0"/>
+          <a:ext cx="0" cy="0"/>
+          <a:chOff x="0" y="0"/>
+          <a:chExt cx="0" cy="0"/>
+        </a:xfrm>
+      </p:grpSpPr>
+      <p:sp>
+        <p:nvSpPr>
+          <p:cNvPr id="4" name="Title 1">
+            <a:extLst>
+              <a:ext uri="{FF2B5EF4-FFF2-40B4-BE49-F238E27FC236}">
+                <a16:creationId xmlns:a16="http://schemas.microsoft.com/office/drawing/2014/main" id="{F9ED8BE6-F7AC-4FD8-8FA8-8C683A7C2F62}"/>
+              </a:ext>
+            </a:extLst>
+          </p:cNvPr>
+          <p:cNvSpPr>
+            <a:spLocks noGrp="1"/>
+          </p:cNvSpPr>
+          <p:nvPr>
+            <p:ph type="title"/>
+          </p:nvPr>
+        </p:nvSpPr>
+        <p:spPr>
+          <a:xfrm>
+            <a:off x="949040" y="365125"/>
+            <a:ext cx="11242960" cy="1325563"/>
+          </a:xfrm>
+        </p:spPr>
+        <p:txBody>
+          <a:bodyPr/>
+          <a:lstStyle/>
+          <a:p>
+            <a:r>
+              <a:rPr lang="en-GB" dirty="0">
+                <a:solidFill>
+                  <a:schemeClr val="bg1">
+                    <a:lumMod val="95000"/>
+                  </a:schemeClr>
+                </a:solidFill>
+                <a:latin typeface="Arial Nova Light" panose="020B0304020202020204" pitchFamily="34" charset="0"/>
+              </a:rPr>
+              <a:t>Decomposition of large hydrocarbon molecules into smaller ones during pyrolysis </a:t>
+            </a:r>
+          </a:p>
+        </p:txBody>
+      </p:sp>
+      <p:pic>
+        <p:nvPicPr>
+          <p:cNvPr id="5" name="Picture 4">
+            <a:extLst>
+              <a:ext uri="{FF2B5EF4-FFF2-40B4-BE49-F238E27FC236}">
+                <a16:creationId xmlns:a16="http://schemas.microsoft.com/office/drawing/2014/main" id="{0E676B66-CA5E-44E1-B29C-AFCB39AFFCBF}"/>
+              </a:ext>
+            </a:extLst>
+          </p:cNvPr>
+          <p:cNvPicPr>
+            <a:picLocks noChangeAspect="1"/>
+          </p:cNvPicPr>
+          <p:nvPr/>
+        </p:nvPicPr>
+        <p:blipFill>
+          <a:blip r:embed="rId2"/>
+          <a:stretch>
+            <a:fillRect/>
+          </a:stretch>
+        </p:blipFill>
+        <p:spPr>
+          <a:xfrm>
+            <a:off x="1388787" y="1690688"/>
+            <a:ext cx="4831399" cy="4644092"/>
+          </a:xfrm>
+          <a:prstGeom prst="rect">
+            <a:avLst/>
+          </a:prstGeom>
+        </p:spPr>
+      </p:pic>
+      <p:sp>
+        <p:nvSpPr>
+          <p:cNvPr id="7" name="Rectangle 6">
+            <a:extLst>
+              <a:ext uri="{FF2B5EF4-FFF2-40B4-BE49-F238E27FC236}">
+                <a16:creationId xmlns:a16="http://schemas.microsoft.com/office/drawing/2014/main" id="{BA6AB84E-0624-4A71-9C0F-D062D87F5C5D}"/>
+              </a:ext>
+            </a:extLst>
+          </p:cNvPr>
+          <p:cNvSpPr/>
+          <p:nvPr/>
+        </p:nvSpPr>
+        <p:spPr>
+          <a:xfrm>
+            <a:off x="949040" y="6334780"/>
+            <a:ext cx="11222719" cy="523220"/>
+          </a:xfrm>
+          <a:prstGeom prst="rect">
+            <a:avLst/>
+          </a:prstGeom>
+        </p:spPr>
+        <p:txBody>
+          <a:bodyPr wrap="square">
+            <a:spAutoFit/>
+          </a:bodyPr>
+          <a:lstStyle/>
+          <a:p>
+            <a:pPr marL="304800" indent="-304800"/>
+            <a:r>
+              <a:rPr lang="en-GB" sz="1400" dirty="0" err="1">
+                <a:solidFill>
+                  <a:schemeClr val="bg1">
+                    <a:lumMod val="95000"/>
+                  </a:schemeClr>
+                </a:solidFill>
+                <a:latin typeface="Arial Nova Light" panose="020B0304020202020204" pitchFamily="34" charset="0"/>
+              </a:rPr>
+              <a:t>Basu</a:t>
+            </a:r>
+            <a:r>
+              <a:rPr lang="en-GB" sz="1400" dirty="0">
+                <a:solidFill>
+                  <a:schemeClr val="bg1">
+                    <a:lumMod val="95000"/>
+                  </a:schemeClr>
+                </a:solidFill>
+                <a:latin typeface="Arial Nova Light" panose="020B0304020202020204" pitchFamily="34" charset="0"/>
+              </a:rPr>
+              <a:t>, P. (2018). Biomass Gasification, Pyrolysis and </a:t>
+            </a:r>
+            <a:r>
+              <a:rPr lang="en-GB" sz="1400" dirty="0" err="1">
+                <a:solidFill>
+                  <a:schemeClr val="bg1">
+                    <a:lumMod val="95000"/>
+                  </a:schemeClr>
+                </a:solidFill>
+                <a:latin typeface="Arial Nova Light" panose="020B0304020202020204" pitchFamily="34" charset="0"/>
+              </a:rPr>
+              <a:t>Torrefaction</a:t>
+            </a:r>
+            <a:r>
+              <a:rPr lang="en-GB" sz="1400" dirty="0">
+                <a:solidFill>
+                  <a:schemeClr val="bg1">
+                    <a:lumMod val="95000"/>
+                  </a:schemeClr>
+                </a:solidFill>
+                <a:latin typeface="Arial Nova Light" panose="020B0304020202020204" pitchFamily="34" charset="0"/>
+              </a:rPr>
+              <a:t> - Practical Design and Theory (3rd Edition). Elsevier. Retrieved from https://app.knovel.com/hotlink/pdf/id:kt011PGVNJ/biomass-gasification/biomass-ga-historical</a:t>
+            </a:r>
+          </a:p>
+        </p:txBody>
+      </p:sp>
+      <mc:AlternateContent xmlns:mc="http://schemas.openxmlformats.org/markup-compatibility/2006">
+        <mc:Choice xmlns:a14="http://schemas.microsoft.com/office/drawing/2010/main" Requires="a14">
+          <p:sp>
+            <p:nvSpPr>
+              <p:cNvPr id="8" name="Content Placeholder 2">
+                <a:extLst>
+                  <a:ext uri="{FF2B5EF4-FFF2-40B4-BE49-F238E27FC236}">
+                    <a16:creationId xmlns:a16="http://schemas.microsoft.com/office/drawing/2014/main" id="{7917E339-891C-4EC8-AE76-E54A6D883E1E}"/>
+                  </a:ext>
+                </a:extLst>
+              </p:cNvPr>
+              <p:cNvSpPr>
+                <a:spLocks noGrp="1"/>
+              </p:cNvSpPr>
+              <p:nvPr>
+                <p:ph idx="1"/>
+              </p:nvPr>
+            </p:nvSpPr>
+            <p:spPr>
+              <a:xfrm>
+                <a:off x="6564312" y="1825625"/>
+                <a:ext cx="5627687" cy="4509156"/>
+              </a:xfrm>
+            </p:spPr>
+            <p:txBody>
+              <a:bodyPr>
+                <a:normAutofit/>
+              </a:bodyPr>
+              <a:lstStyle/>
+              <a:p>
+                <a:pPr marL="0" indent="0">
+                  <a:buNone/>
+                </a:pPr>
+                <a:r>
+                  <a:rPr lang="en-GB" b="1" dirty="0">
+                    <a:solidFill>
+                      <a:schemeClr val="tx2">
+                        <a:lumMod val="75000"/>
+                      </a:schemeClr>
+                    </a:solidFill>
+                    <a:latin typeface="Arial Nova Light" panose="020B0304020202020204" pitchFamily="34" charset="0"/>
+                  </a:rPr>
+                  <a:t>Pyrolysis Products</a:t>
+                </a:r>
+              </a:p>
+              <a:p>
+                <a:r>
+                  <a:rPr lang="en-GB" dirty="0">
+                    <a:solidFill>
+                      <a:schemeClr val="bg1">
+                        <a:lumMod val="95000"/>
+                      </a:schemeClr>
+                    </a:solidFill>
+                    <a:latin typeface="Arial Nova Light" panose="020B0304020202020204" pitchFamily="34" charset="0"/>
+                  </a:rPr>
+                  <a:t>Liquids</a:t>
+                </a:r>
+              </a:p>
+              <a:p>
+                <a:pPr lvl="1"/>
+                <a:r>
+                  <a:rPr lang="en-GB" dirty="0">
+                    <a:solidFill>
+                      <a:schemeClr val="bg1">
+                        <a:lumMod val="95000"/>
+                      </a:schemeClr>
+                    </a:solidFill>
+                    <a:latin typeface="Arial Nova Light" panose="020B0304020202020204" pitchFamily="34" charset="0"/>
+                  </a:rPr>
+                  <a:t>Heavier hydrocarbons</a:t>
+                </a:r>
+              </a:p>
+              <a:p>
+                <a:pPr lvl="1"/>
+                <a:r>
+                  <a:rPr lang="en-GB" dirty="0">
+                    <a:solidFill>
+                      <a:schemeClr val="bg1">
+                        <a:lumMod val="95000"/>
+                      </a:schemeClr>
+                    </a:solidFill>
+                    <a:latin typeface="Arial Nova Light" panose="020B0304020202020204" pitchFamily="34" charset="0"/>
+                  </a:rPr>
+                  <a:t>water</a:t>
+                </a:r>
+              </a:p>
+              <a:p>
+                <a:r>
+                  <a:rPr lang="en-GB" sz="2800" dirty="0">
+                    <a:solidFill>
+                      <a:schemeClr val="bg1">
+                        <a:lumMod val="95000"/>
+                      </a:schemeClr>
+                    </a:solidFill>
+                    <a:latin typeface="Arial Nova Light" panose="020B0304020202020204" pitchFamily="34" charset="0"/>
+                  </a:rPr>
+                  <a:t>Solids</a:t>
+                </a:r>
+              </a:p>
+              <a:p>
+                <a:pPr lvl="1"/>
+                <a:r>
+                  <a:rPr lang="en-GB" dirty="0">
+                    <a:solidFill>
+                      <a:schemeClr val="bg1">
+                        <a:lumMod val="95000"/>
+                      </a:schemeClr>
+                    </a:solidFill>
+                    <a:latin typeface="Arial Nova Light" panose="020B0304020202020204" pitchFamily="34" charset="0"/>
+                  </a:rPr>
+                  <a:t>char &amp; carbon</a:t>
+                </a:r>
+              </a:p>
+              <a:p>
+                <a:r>
+                  <a:rPr lang="en-GB" dirty="0">
+                    <a:solidFill>
+                      <a:schemeClr val="bg1">
+                        <a:lumMod val="95000"/>
+                      </a:schemeClr>
+                    </a:solidFill>
+                    <a:latin typeface="Arial Nova Light" panose="020B0304020202020204" pitchFamily="34" charset="0"/>
+                  </a:rPr>
+                  <a:t>Gases</a:t>
+                </a:r>
+              </a:p>
+              <a:p>
+                <a:pPr lvl="1"/>
+                <a14:m>
+                  <m:oMath xmlns:m="http://schemas.openxmlformats.org/officeDocument/2006/math">
+                    <m:r>
+                      <a:rPr lang="es-MX" b="0" i="1" smtClean="0">
+                        <a:solidFill>
+                          <a:schemeClr val="bg1">
+                            <a:lumMod val="95000"/>
+                          </a:schemeClr>
+                        </a:solidFill>
+                        <a:latin typeface="Cambria Math" panose="02040503050406030204" pitchFamily="18" charset="0"/>
+                      </a:rPr>
+                      <m:t>𝐶</m:t>
+                    </m:r>
+                    <m:sSub>
+                      <m:sSubPr>
+                        <m:ctrlPr>
+                          <a:rPr lang="es-MX" b="0" i="1" smtClean="0">
+                            <a:solidFill>
+                              <a:schemeClr val="bg1">
+                                <a:lumMod val="95000"/>
+                              </a:schemeClr>
+                            </a:solidFill>
+                            <a:latin typeface="Cambria Math" panose="02040503050406030204" pitchFamily="18" charset="0"/>
+                          </a:rPr>
+                        </m:ctrlPr>
+                      </m:sSubPr>
+                      <m:e>
+                        <m:r>
+                          <a:rPr lang="es-MX" b="0" i="1" smtClean="0">
+                            <a:solidFill>
+                              <a:schemeClr val="bg1">
+                                <a:lumMod val="95000"/>
+                              </a:schemeClr>
+                            </a:solidFill>
+                            <a:latin typeface="Cambria Math" panose="02040503050406030204" pitchFamily="18" charset="0"/>
+                          </a:rPr>
+                          <m:t>𝑂</m:t>
+                        </m:r>
+                      </m:e>
+                      <m:sub>
+                        <m:r>
+                          <a:rPr lang="es-MX" b="0" i="1" smtClean="0">
+                            <a:solidFill>
+                              <a:schemeClr val="bg1">
+                                <a:lumMod val="95000"/>
+                              </a:schemeClr>
+                            </a:solidFill>
+                            <a:latin typeface="Cambria Math" panose="02040503050406030204" pitchFamily="18" charset="0"/>
+                          </a:rPr>
+                          <m:t>2</m:t>
+                        </m:r>
+                      </m:sub>
+                    </m:sSub>
+                  </m:oMath>
+                </a14:m>
+                <a:r>
+                  <a:rPr lang="en-GB" dirty="0">
+                    <a:solidFill>
+                      <a:schemeClr val="bg1">
+                        <a:lumMod val="95000"/>
+                      </a:schemeClr>
+                    </a:solidFill>
+                    <a:latin typeface="Arial Nova Light" panose="020B0304020202020204" pitchFamily="34" charset="0"/>
+                  </a:rPr>
+                  <a:t>, </a:t>
+                </a:r>
+                <a14:m>
+                  <m:oMath xmlns:m="http://schemas.openxmlformats.org/officeDocument/2006/math">
+                    <m:sSub>
+                      <m:sSubPr>
+                        <m:ctrlPr>
+                          <a:rPr lang="es-MX" i="1">
+                            <a:solidFill>
+                              <a:schemeClr val="bg1">
+                                <a:lumMod val="95000"/>
+                              </a:schemeClr>
+                            </a:solidFill>
+                            <a:latin typeface="Cambria Math" panose="02040503050406030204" pitchFamily="18" charset="0"/>
+                          </a:rPr>
+                        </m:ctrlPr>
+                      </m:sSubPr>
+                      <m:e>
+                        <m:r>
+                          <a:rPr lang="es-MX" b="0" i="1" smtClean="0">
+                            <a:solidFill>
+                              <a:schemeClr val="bg1">
+                                <a:lumMod val="95000"/>
+                              </a:schemeClr>
+                            </a:solidFill>
+                            <a:latin typeface="Cambria Math" panose="02040503050406030204" pitchFamily="18" charset="0"/>
+                          </a:rPr>
+                          <m:t>𝐻</m:t>
+                        </m:r>
+                      </m:e>
+                      <m:sub>
+                        <m:r>
+                          <a:rPr lang="es-MX" b="0" i="1" smtClean="0">
+                            <a:solidFill>
+                              <a:schemeClr val="bg1">
+                                <a:lumMod val="95000"/>
+                              </a:schemeClr>
+                            </a:solidFill>
+                            <a:latin typeface="Cambria Math" panose="02040503050406030204" pitchFamily="18" charset="0"/>
+                          </a:rPr>
+                          <m:t>2</m:t>
+                        </m:r>
+                      </m:sub>
+                    </m:sSub>
+                    <m:r>
+                      <a:rPr lang="es-MX" b="0" i="1" smtClean="0">
+                        <a:solidFill>
+                          <a:schemeClr val="bg1">
+                            <a:lumMod val="95000"/>
+                          </a:schemeClr>
+                        </a:solidFill>
+                        <a:latin typeface="Cambria Math" panose="02040503050406030204" pitchFamily="18" charset="0"/>
+                      </a:rPr>
+                      <m:t>𝑂</m:t>
+                    </m:r>
+                  </m:oMath>
+                </a14:m>
+                <a:r>
+                  <a:rPr lang="en-GB" dirty="0">
+                    <a:solidFill>
+                      <a:schemeClr val="bg1">
+                        <a:lumMod val="95000"/>
+                      </a:schemeClr>
+                    </a:solidFill>
+                    <a:latin typeface="Arial Nova Light" panose="020B0304020202020204" pitchFamily="34" charset="0"/>
+                  </a:rPr>
+                  <a:t>, </a:t>
+                </a:r>
+                <a14:m>
+                  <m:oMath xmlns:m="http://schemas.openxmlformats.org/officeDocument/2006/math">
+                    <m:r>
+                      <a:rPr lang="es-MX" b="0" i="1" smtClean="0">
+                        <a:solidFill>
+                          <a:schemeClr val="bg1">
+                            <a:lumMod val="95000"/>
+                          </a:schemeClr>
+                        </a:solidFill>
+                        <a:latin typeface="Cambria Math" panose="02040503050406030204" pitchFamily="18" charset="0"/>
+                      </a:rPr>
+                      <m:t>𝐶𝑂</m:t>
+                    </m:r>
+                  </m:oMath>
+                </a14:m>
+                <a:r>
+                  <a:rPr lang="en-GB" dirty="0">
+                    <a:solidFill>
+                      <a:schemeClr val="bg1">
+                        <a:lumMod val="95000"/>
+                      </a:schemeClr>
+                    </a:solidFill>
+                    <a:latin typeface="Arial Nova Light" panose="020B0304020202020204" pitchFamily="34" charset="0"/>
+                  </a:rPr>
+                  <a:t>, </a:t>
+                </a:r>
+                <a14:m>
+                  <m:oMath xmlns:m="http://schemas.openxmlformats.org/officeDocument/2006/math">
+                    <m:sSub>
+                      <m:sSubPr>
+                        <m:ctrlPr>
+                          <a:rPr lang="es-MX" i="1">
+                            <a:solidFill>
+                              <a:schemeClr val="bg1">
+                                <a:lumMod val="95000"/>
+                              </a:schemeClr>
+                            </a:solidFill>
+                            <a:latin typeface="Cambria Math" panose="02040503050406030204" pitchFamily="18" charset="0"/>
+                          </a:rPr>
+                        </m:ctrlPr>
+                      </m:sSubPr>
+                      <m:e>
+                        <m:r>
+                          <a:rPr lang="es-MX" b="0" i="1" smtClean="0">
+                            <a:solidFill>
+                              <a:schemeClr val="bg1">
+                                <a:lumMod val="95000"/>
+                              </a:schemeClr>
+                            </a:solidFill>
+                            <a:latin typeface="Cambria Math" panose="02040503050406030204" pitchFamily="18" charset="0"/>
+                          </a:rPr>
+                          <m:t>𝐶</m:t>
+                        </m:r>
+                      </m:e>
+                      <m:sub>
+                        <m:r>
+                          <a:rPr lang="es-MX" b="0" i="1" smtClean="0">
+                            <a:solidFill>
+                              <a:schemeClr val="bg1">
+                                <a:lumMod val="95000"/>
+                              </a:schemeClr>
+                            </a:solidFill>
+                            <a:latin typeface="Cambria Math" panose="02040503050406030204" pitchFamily="18" charset="0"/>
+                          </a:rPr>
+                          <m:t>2</m:t>
+                        </m:r>
+                      </m:sub>
+                    </m:sSub>
+                    <m:sSub>
+                      <m:sSubPr>
+                        <m:ctrlPr>
+                          <a:rPr lang="es-MX" i="1">
+                            <a:solidFill>
+                              <a:schemeClr val="bg1">
+                                <a:lumMod val="95000"/>
+                              </a:schemeClr>
+                            </a:solidFill>
+                            <a:latin typeface="Cambria Math" panose="02040503050406030204" pitchFamily="18" charset="0"/>
+                          </a:rPr>
+                        </m:ctrlPr>
+                      </m:sSubPr>
+                      <m:e>
+                        <m:r>
+                          <a:rPr lang="es-MX" b="0" i="1" smtClean="0">
+                            <a:solidFill>
+                              <a:schemeClr val="bg1">
+                                <a:lumMod val="95000"/>
+                              </a:schemeClr>
+                            </a:solidFill>
+                            <a:latin typeface="Cambria Math" panose="02040503050406030204" pitchFamily="18" charset="0"/>
+                          </a:rPr>
+                          <m:t>𝐻</m:t>
+                        </m:r>
+                      </m:e>
+                      <m:sub>
+                        <m:r>
+                          <a:rPr lang="es-MX" i="1">
+                            <a:solidFill>
+                              <a:schemeClr val="bg1">
+                                <a:lumMod val="95000"/>
+                              </a:schemeClr>
+                            </a:solidFill>
+                            <a:latin typeface="Cambria Math" panose="02040503050406030204" pitchFamily="18" charset="0"/>
+                          </a:rPr>
+                          <m:t>2</m:t>
+                        </m:r>
+                      </m:sub>
+                    </m:sSub>
+                  </m:oMath>
+                </a14:m>
+                <a:r>
+                  <a:rPr lang="en-GB" dirty="0">
+                    <a:solidFill>
+                      <a:schemeClr val="bg1">
+                        <a:lumMod val="95000"/>
+                      </a:schemeClr>
+                    </a:solidFill>
+                    <a:latin typeface="Arial Nova Light" panose="020B0304020202020204" pitchFamily="34" charset="0"/>
+                  </a:rPr>
+                  <a:t>, </a:t>
+                </a:r>
+                <a14:m>
+                  <m:oMath xmlns:m="http://schemas.openxmlformats.org/officeDocument/2006/math">
+                    <m:sSub>
+                      <m:sSubPr>
+                        <m:ctrlPr>
+                          <a:rPr lang="es-MX" i="1">
+                            <a:solidFill>
+                              <a:schemeClr val="bg1">
+                                <a:lumMod val="95000"/>
+                              </a:schemeClr>
+                            </a:solidFill>
+                            <a:latin typeface="Cambria Math" panose="02040503050406030204" pitchFamily="18" charset="0"/>
+                          </a:rPr>
+                        </m:ctrlPr>
+                      </m:sSubPr>
+                      <m:e>
+                        <m:r>
+                          <a:rPr lang="es-MX" i="1">
+                            <a:solidFill>
+                              <a:schemeClr val="bg1">
+                                <a:lumMod val="95000"/>
+                              </a:schemeClr>
+                            </a:solidFill>
+                            <a:latin typeface="Cambria Math" panose="02040503050406030204" pitchFamily="18" charset="0"/>
+                          </a:rPr>
+                          <m:t>𝐶</m:t>
+                        </m:r>
+                      </m:e>
+                      <m:sub>
+                        <m:r>
+                          <a:rPr lang="es-MX" b="0" i="1" smtClean="0">
+                            <a:solidFill>
+                              <a:schemeClr val="bg1">
+                                <a:lumMod val="95000"/>
+                              </a:schemeClr>
+                            </a:solidFill>
+                            <a:latin typeface="Cambria Math" panose="02040503050406030204" pitchFamily="18" charset="0"/>
+                          </a:rPr>
+                          <m:t>2</m:t>
+                        </m:r>
+                      </m:sub>
+                    </m:sSub>
+                    <m:sSub>
+                      <m:sSubPr>
+                        <m:ctrlPr>
+                          <a:rPr lang="es-MX" i="1">
+                            <a:solidFill>
+                              <a:schemeClr val="bg1">
+                                <a:lumMod val="95000"/>
+                              </a:schemeClr>
+                            </a:solidFill>
+                            <a:latin typeface="Cambria Math" panose="02040503050406030204" pitchFamily="18" charset="0"/>
+                          </a:rPr>
+                        </m:ctrlPr>
+                      </m:sSubPr>
+                      <m:e>
+                        <m:r>
+                          <a:rPr lang="es-MX" b="0" i="1" smtClean="0">
+                            <a:solidFill>
+                              <a:schemeClr val="bg1">
+                                <a:lumMod val="95000"/>
+                              </a:schemeClr>
+                            </a:solidFill>
+                            <a:latin typeface="Cambria Math" panose="02040503050406030204" pitchFamily="18" charset="0"/>
+                          </a:rPr>
+                          <m:t>𝐻</m:t>
+                        </m:r>
+                      </m:e>
+                      <m:sub>
+                        <m:r>
+                          <a:rPr lang="es-MX" b="0" i="1" smtClean="0">
+                            <a:solidFill>
+                              <a:schemeClr val="bg1">
+                                <a:lumMod val="95000"/>
+                              </a:schemeClr>
+                            </a:solidFill>
+                            <a:latin typeface="Cambria Math" panose="02040503050406030204" pitchFamily="18" charset="0"/>
+                          </a:rPr>
+                          <m:t>4</m:t>
+                        </m:r>
+                      </m:sub>
+                    </m:sSub>
+                  </m:oMath>
+                </a14:m>
+                <a:r>
+                  <a:rPr lang="en-GB" dirty="0">
+                    <a:solidFill>
+                      <a:schemeClr val="bg1">
+                        <a:lumMod val="95000"/>
+                      </a:schemeClr>
+                    </a:solidFill>
+                    <a:latin typeface="Arial Nova Light" panose="020B0304020202020204" pitchFamily="34" charset="0"/>
+                  </a:rPr>
+                  <a:t>, </a:t>
+                </a:r>
+                <a14:m>
+                  <m:oMath xmlns:m="http://schemas.openxmlformats.org/officeDocument/2006/math">
+                    <m:sSub>
+                      <m:sSubPr>
+                        <m:ctrlPr>
+                          <a:rPr lang="es-MX" i="1">
+                            <a:solidFill>
+                              <a:schemeClr val="bg1">
+                                <a:lumMod val="95000"/>
+                              </a:schemeClr>
+                            </a:solidFill>
+                            <a:latin typeface="Cambria Math" panose="02040503050406030204" pitchFamily="18" charset="0"/>
+                          </a:rPr>
+                        </m:ctrlPr>
+                      </m:sSubPr>
+                      <m:e>
+                        <m:r>
+                          <a:rPr lang="es-MX" i="1">
+                            <a:solidFill>
+                              <a:schemeClr val="bg1">
+                                <a:lumMod val="95000"/>
+                              </a:schemeClr>
+                            </a:solidFill>
+                            <a:latin typeface="Cambria Math" panose="02040503050406030204" pitchFamily="18" charset="0"/>
+                          </a:rPr>
+                          <m:t>𝐶</m:t>
+                        </m:r>
+                      </m:e>
+                      <m:sub>
+                        <m:r>
+                          <a:rPr lang="es-MX" b="0" i="1" smtClean="0">
+                            <a:solidFill>
+                              <a:schemeClr val="bg1">
+                                <a:lumMod val="95000"/>
+                              </a:schemeClr>
+                            </a:solidFill>
+                            <a:latin typeface="Cambria Math" panose="02040503050406030204" pitchFamily="18" charset="0"/>
+                          </a:rPr>
+                          <m:t>2</m:t>
+                        </m:r>
+                      </m:sub>
+                    </m:sSub>
+                    <m:sSub>
+                      <m:sSubPr>
+                        <m:ctrlPr>
+                          <a:rPr lang="es-MX" i="1">
+                            <a:solidFill>
+                              <a:schemeClr val="bg1">
+                                <a:lumMod val="95000"/>
+                              </a:schemeClr>
+                            </a:solidFill>
+                            <a:latin typeface="Cambria Math" panose="02040503050406030204" pitchFamily="18" charset="0"/>
+                          </a:rPr>
+                        </m:ctrlPr>
+                      </m:sSubPr>
+                      <m:e>
+                        <m:r>
+                          <a:rPr lang="es-MX" b="0" i="1" smtClean="0">
+                            <a:solidFill>
+                              <a:schemeClr val="bg1">
+                                <a:lumMod val="95000"/>
+                              </a:schemeClr>
+                            </a:solidFill>
+                            <a:latin typeface="Cambria Math" panose="02040503050406030204" pitchFamily="18" charset="0"/>
+                          </a:rPr>
+                          <m:t>𝐻</m:t>
+                        </m:r>
+                      </m:e>
+                      <m:sub>
+                        <m:r>
+                          <a:rPr lang="es-MX" b="0" i="1" smtClean="0">
+                            <a:solidFill>
+                              <a:schemeClr val="bg1">
+                                <a:lumMod val="95000"/>
+                              </a:schemeClr>
+                            </a:solidFill>
+                            <a:latin typeface="Cambria Math" panose="02040503050406030204" pitchFamily="18" charset="0"/>
+                          </a:rPr>
+                          <m:t>6</m:t>
+                        </m:r>
+                      </m:sub>
+                    </m:sSub>
+                  </m:oMath>
+                </a14:m>
+                <a:r>
+                  <a:rPr lang="en-GB" dirty="0">
+                    <a:solidFill>
+                      <a:schemeClr val="bg1">
+                        <a:lumMod val="95000"/>
+                      </a:schemeClr>
+                    </a:solidFill>
+                    <a:latin typeface="Arial Nova Light" panose="020B0304020202020204" pitchFamily="34" charset="0"/>
+                  </a:rPr>
+                  <a:t>, </a:t>
+                </a:r>
+                <a14:m>
+                  <m:oMath xmlns:m="http://schemas.openxmlformats.org/officeDocument/2006/math">
+                    <m:sSub>
+                      <m:sSubPr>
+                        <m:ctrlPr>
+                          <a:rPr lang="es-MX" i="1">
+                            <a:solidFill>
+                              <a:schemeClr val="bg1">
+                                <a:lumMod val="95000"/>
+                              </a:schemeClr>
+                            </a:solidFill>
+                            <a:latin typeface="Cambria Math" panose="02040503050406030204" pitchFamily="18" charset="0"/>
+                          </a:rPr>
+                        </m:ctrlPr>
+                      </m:sSubPr>
+                      <m:e>
+                        <m:r>
+                          <a:rPr lang="es-MX" i="1">
+                            <a:solidFill>
+                              <a:schemeClr val="bg1">
+                                <a:lumMod val="95000"/>
+                              </a:schemeClr>
+                            </a:solidFill>
+                            <a:latin typeface="Cambria Math" panose="02040503050406030204" pitchFamily="18" charset="0"/>
+                          </a:rPr>
+                          <m:t>𝐶</m:t>
+                        </m:r>
+                      </m:e>
+                      <m:sub>
+                        <m:r>
+                          <a:rPr lang="es-MX" b="0" i="1" smtClean="0">
+                            <a:solidFill>
+                              <a:schemeClr val="bg1">
+                                <a:lumMod val="95000"/>
+                              </a:schemeClr>
+                            </a:solidFill>
+                            <a:latin typeface="Cambria Math" panose="02040503050406030204" pitchFamily="18" charset="0"/>
+                          </a:rPr>
+                          <m:t>6</m:t>
+                        </m:r>
+                      </m:sub>
+                    </m:sSub>
+                    <m:sSub>
+                      <m:sSubPr>
+                        <m:ctrlPr>
+                          <a:rPr lang="es-MX" i="1">
+                            <a:solidFill>
+                              <a:schemeClr val="bg1">
+                                <a:lumMod val="95000"/>
+                              </a:schemeClr>
+                            </a:solidFill>
+                            <a:latin typeface="Cambria Math" panose="02040503050406030204" pitchFamily="18" charset="0"/>
+                          </a:rPr>
+                        </m:ctrlPr>
+                      </m:sSubPr>
+                      <m:e>
+                        <m:r>
+                          <a:rPr lang="es-MX" b="0" i="1" smtClean="0">
+                            <a:solidFill>
+                              <a:schemeClr val="bg1">
+                                <a:lumMod val="95000"/>
+                              </a:schemeClr>
+                            </a:solidFill>
+                            <a:latin typeface="Cambria Math" panose="02040503050406030204" pitchFamily="18" charset="0"/>
+                          </a:rPr>
+                          <m:t>𝐻</m:t>
+                        </m:r>
+                      </m:e>
+                      <m:sub>
+                        <m:r>
+                          <a:rPr lang="es-MX" b="0" i="1" smtClean="0">
+                            <a:solidFill>
+                              <a:schemeClr val="bg1">
+                                <a:lumMod val="95000"/>
+                              </a:schemeClr>
+                            </a:solidFill>
+                            <a:latin typeface="Cambria Math" panose="02040503050406030204" pitchFamily="18" charset="0"/>
+                          </a:rPr>
+                          <m:t>6</m:t>
+                        </m:r>
+                      </m:sub>
+                    </m:sSub>
+                  </m:oMath>
+                </a14:m>
+                <a:endParaRPr lang="en-GB" dirty="0">
+                  <a:solidFill>
+                    <a:schemeClr val="bg1">
+                      <a:lumMod val="95000"/>
+                    </a:schemeClr>
+                  </a:solidFill>
+                  <a:latin typeface="Arial Nova Light" panose="020B0304020202020204" pitchFamily="34" charset="0"/>
+                </a:endParaRPr>
+              </a:p>
+              <a:p>
+                <a:endParaRPr lang="en-GB" dirty="0">
+                  <a:solidFill>
+                    <a:schemeClr val="bg1">
+                      <a:lumMod val="95000"/>
+                    </a:schemeClr>
+                  </a:solidFill>
+                  <a:latin typeface="Arial Nova Light" panose="020B0304020202020204" pitchFamily="34" charset="0"/>
+                </a:endParaRPr>
+              </a:p>
+              <a:p>
+                <a:endParaRPr lang="en-GB" dirty="0">
+                  <a:solidFill>
+                    <a:schemeClr val="bg1">
+                      <a:lumMod val="95000"/>
+                    </a:schemeClr>
+                  </a:solidFill>
+                  <a:latin typeface="Arial Nova Light" panose="020B0304020202020204" pitchFamily="34" charset="0"/>
+                </a:endParaRPr>
+              </a:p>
+            </p:txBody>
+          </p:sp>
+        </mc:Choice>
+        <mc:Fallback>
+          <p:sp>
+            <p:nvSpPr>
+              <p:cNvPr id="8" name="Content Placeholder 2">
+                <a:extLst>
+                  <a:ext uri="{FF2B5EF4-FFF2-40B4-BE49-F238E27FC236}">
+                    <a16:creationId xmlns:a16="http://schemas.microsoft.com/office/drawing/2014/main" id="{7917E339-891C-4EC8-AE76-E54A6D883E1E}"/>
+                  </a:ext>
+                </a:extLst>
+              </p:cNvPr>
+              <p:cNvSpPr>
+                <a:spLocks noGrp="1" noRot="1" noChangeAspect="1" noMove="1" noResize="1" noEditPoints="1" noAdjustHandles="1" noChangeArrowheads="1" noChangeShapeType="1" noTextEdit="1"/>
+              </p:cNvSpPr>
+              <p:nvPr>
+                <p:ph idx="1"/>
+              </p:nvPr>
+            </p:nvSpPr>
+            <p:spPr>
+              <a:xfrm>
+                <a:off x="6564312" y="1825625"/>
+                <a:ext cx="5627687" cy="4509156"/>
+              </a:xfrm>
+              <a:blipFill>
+                <a:blip r:embed="rId3"/>
+                <a:stretch>
+                  <a:fillRect l="-2275" t="-2297"/>
+                </a:stretch>
+              </a:blipFill>
+            </p:spPr>
+            <p:txBody>
+              <a:bodyPr/>
+              <a:lstStyle/>
+              <a:p>
+                <a:r>
+                  <a:rPr lang="en-GB">
+                    <a:noFill/>
+                  </a:rPr>
+                  <a:t> </a:t>
+                </a:r>
+              </a:p>
+            </p:txBody>
+          </p:sp>
+        </mc:Fallback>
+      </mc:AlternateContent>
+    </p:spTree>
+    <p:extLst>
+      <p:ext uri="{BB962C8B-B14F-4D97-AF65-F5344CB8AC3E}">
+        <p14:creationId xmlns:p14="http://schemas.microsoft.com/office/powerpoint/2010/main" val="1380703515"/>
       </p:ext>
     </p:extLst>
   </p:cSld>

</xml_diff>